<commit_message>
clean up of concepts and files for the core concep
</commit_message>
<xml_diff>
--- a/Philosophy/INTENT_Intentr_Executive_Deck_With_Diagrams.pptx
+++ b/Philosophy/INTENT_Intentr_Executive_Deck_With_Diagrams.pptx
@@ -4,30 +4,33 @@
   <p:sldMasterIdLst>
     <p:sldMasterId id="2147483648" r:id="rId1"/>
   </p:sldMasterIdLst>
+  <p:notesMasterIdLst>
+    <p:notesMasterId r:id="rId25"/>
+  </p:notesMasterIdLst>
   <p:sldIdLst>
-    <p:sldId id="256" r:id="rId7"/>
-    <p:sldId id="257" r:id="rId8"/>
-    <p:sldId id="258" r:id="rId9"/>
-    <p:sldId id="259" r:id="rId10"/>
-    <p:sldId id="260" r:id="rId11"/>
-    <p:sldId id="261" r:id="rId12"/>
-    <p:sldId id="262" r:id="rId13"/>
-    <p:sldId id="263" r:id="rId14"/>
-    <p:sldId id="264" r:id="rId15"/>
-    <p:sldId id="265" r:id="rId16"/>
-    <p:sldId id="266" r:id="rId17"/>
-    <p:sldId id="267" r:id="rId18"/>
-    <p:sldId id="268" r:id="rId19"/>
-    <p:sldId id="269" r:id="rId20"/>
-    <p:sldId id="270" r:id="rId21"/>
-    <p:sldId id="271" r:id="rId23"/>
-    <p:sldId id="272" r:id="rId24"/>
-    <p:sldId id="273" r:id="rId25"/>
-    <p:sldId id="274" r:id="rId26"/>
-    <p:sldId id="275" r:id="rId27"/>
-    <p:sldId id="276" r:id="rId28"/>
-    <p:sldId id="277" r:id="rId29"/>
-    <p:sldId id="278" r:id="rId30"/>
+    <p:sldId id="256" r:id="rId2"/>
+    <p:sldId id="257" r:id="rId3"/>
+    <p:sldId id="258" r:id="rId4"/>
+    <p:sldId id="259" r:id="rId5"/>
+    <p:sldId id="260" r:id="rId6"/>
+    <p:sldId id="261" r:id="rId7"/>
+    <p:sldId id="262" r:id="rId8"/>
+    <p:sldId id="263" r:id="rId9"/>
+    <p:sldId id="264" r:id="rId10"/>
+    <p:sldId id="265" r:id="rId11"/>
+    <p:sldId id="266" r:id="rId12"/>
+    <p:sldId id="267" r:id="rId13"/>
+    <p:sldId id="268" r:id="rId14"/>
+    <p:sldId id="269" r:id="rId15"/>
+    <p:sldId id="270" r:id="rId16"/>
+    <p:sldId id="271" r:id="rId17"/>
+    <p:sldId id="272" r:id="rId18"/>
+    <p:sldId id="273" r:id="rId19"/>
+    <p:sldId id="274" r:id="rId20"/>
+    <p:sldId id="275" r:id="rId21"/>
+    <p:sldId id="276" r:id="rId22"/>
+    <p:sldId id="277" r:id="rId23"/>
+    <p:sldId id="278" r:id="rId24"/>
   </p:sldIdLst>
   <p:sldSz cx="9144000" cy="6858000" type="screen4x3"/>
   <p:notesSz cx="6858000" cy="9144000"/>
@@ -126,11 +129,27 @@
       </a:defRPr>
     </a:lvl9pPr>
   </p:defaultTextStyle>
+  <p:extLst>
+    <p:ext uri="{EFAFB233-063F-42B5-8137-9DF3F51BA10A}">
+      <p15:sldGuideLst xmlns:p15="http://schemas.microsoft.com/office/powerpoint/2012/main">
+        <p15:guide id="1" orient="horz" pos="2160">
+          <p15:clr>
+            <a:srgbClr val="A4A3A4"/>
+          </p15:clr>
+        </p15:guide>
+        <p15:guide id="2" pos="2880">
+          <p15:clr>
+            <a:srgbClr val="A4A3A4"/>
+          </p15:clr>
+        </p15:guide>
+      </p15:sldGuideLst>
+    </p:ext>
+  </p:extLst>
 </p:presentation>
 </file>
 
 <file path=ppt/notesMasters/notesMaster1.xml><?xml version="1.0" encoding="utf-8"?>
-<p:notesMaster xmlns:a="http://schemas.openxmlformats.org/drawingml/2006/main" xmlns:p="http://schemas.openxmlformats.org/presentationml/2006/main" xmlns:r="http://schemas.openxmlformats.org/officeDocument/2006/relationships">
+<p:notesMaster xmlns:a="http://schemas.openxmlformats.org/drawingml/2006/main" xmlns:r="http://schemas.openxmlformats.org/officeDocument/2006/relationships" xmlns:p="http://schemas.openxmlformats.org/presentationml/2006/main">
   <p:cSld>
     <p:bg>
       <p:bgRef idx="1001">
@@ -151,241 +170,16 @@
           <a:chExt cx="0" cy="0"/>
         </a:xfrm>
       </p:grpSpPr>
-      <p:sp>
-        <p:nvSpPr>
-          <p:cNvPr id="2" name="Header Placeholder 1"/>
-          <p:cNvSpPr>
-            <a:spLocks noGrp="1"/>
-          </p:cNvSpPr>
-          <p:nvPr>
-            <p:ph type="hdr" sz="quarter"/>
-          </p:nvPr>
-        </p:nvSpPr>
-        <p:spPr>
-          <a:xfrm>
-            <a:off x="0" y="0"/>
-            <a:ext cx="2971800" cy="457200"/>
-          </a:xfrm>
-          <a:prstGeom prst="rect">
-            <a:avLst/>
-          </a:prstGeom>
-        </p:spPr>
-        <p:txBody>
-          <a:bodyPr vert="horz" lIns="91440" tIns="45720" rIns="91440" bIns="45720" rtlCol="0"/>
-          <a:lstStyle>
-            <a:lvl1pPr algn="l">
-              <a:defRPr sz="1200"/>
-            </a:lvl1pPr>
-          </a:lstStyle>
-          <a:p>
-            <a:endParaRPr lang="en-US"/>
-          </a:p>
-        </p:txBody>
-      </p:sp>
-      <p:sp>
-        <p:nvSpPr>
-          <p:cNvPr id="3" name="Date Placeholder 2"/>
-          <p:cNvSpPr>
-            <a:spLocks noGrp="1"/>
-          </p:cNvSpPr>
-          <p:nvPr>
-            <p:ph type="dt" idx="1"/>
-          </p:nvPr>
-        </p:nvSpPr>
-        <p:spPr>
-          <a:xfrm>
-            <a:off x="3884613" y="0"/>
-            <a:ext cx="2971800" cy="457200"/>
-          </a:xfrm>
-          <a:prstGeom prst="rect">
-            <a:avLst/>
-          </a:prstGeom>
-        </p:spPr>
-        <p:txBody>
-          <a:bodyPr vert="horz" lIns="91440" tIns="45720" rIns="91440" bIns="45720" rtlCol="0"/>
-          <a:lstStyle>
-            <a:lvl1pPr algn="r">
-              <a:defRPr sz="1200"/>
-            </a:lvl1pPr>
-          </a:lstStyle>
-          <a:p>
-            <a:fld id="{0F89C1C7-3DCD-1040-A9CF-14679D8B5DDD}" type="datetimeFigureOut">
-              <a:rPr lang="en-US" smtClean="0"/>
-              <a:t>10/17/16</a:t>
-            </a:fld>
-            <a:endParaRPr lang="en-US"/>
-          </a:p>
-        </p:txBody>
-      </p:sp>
-      <p:sp>
-        <p:nvSpPr>
-          <p:cNvPr id="4" name="Slide Image Placeholder 3"/>
-          <p:cNvSpPr>
-            <a:spLocks noGrp="1" noRot="1" noChangeAspect="1"/>
-          </p:cNvSpPr>
-          <p:nvPr>
-            <p:ph type="sldImg" idx="2"/>
-          </p:nvPr>
-        </p:nvSpPr>
-        <p:spPr>
-          <a:xfrm>
-            <a:off x="1143000" y="685800"/>
-            <a:ext cx="4572000" cy="3429000"/>
-          </a:xfrm>
-          <a:prstGeom prst="rect">
-            <a:avLst/>
-          </a:prstGeom>
-          <a:noFill/>
-          <a:ln w="12700">
-            <a:solidFill>
-              <a:prstClr val="black"/>
-            </a:solidFill>
-          </a:ln>
-        </p:spPr>
-        <p:txBody>
-          <a:bodyPr vert="horz" lIns="91440" tIns="45720" rIns="91440" bIns="45720" rtlCol="0" anchor="ctr"/>
-          <a:lstStyle/>
-          <a:p>
-            <a:endParaRPr lang="en-US"/>
-          </a:p>
-        </p:txBody>
-      </p:sp>
-      <p:sp>
-        <p:nvSpPr>
-          <p:cNvPr id="5" name="Notes Placeholder 4"/>
-          <p:cNvSpPr>
-            <a:spLocks noGrp="1"/>
-          </p:cNvSpPr>
-          <p:nvPr>
-            <p:ph type="body" sz="quarter" idx="3"/>
-          </p:nvPr>
-        </p:nvSpPr>
-        <p:spPr>
-          <a:xfrm>
-            <a:off x="685800" y="4343400"/>
-            <a:ext cx="5486400" cy="4114800"/>
-          </a:xfrm>
-          <a:prstGeom prst="rect">
-            <a:avLst/>
-          </a:prstGeom>
-        </p:spPr>
-        <p:txBody>
-          <a:bodyPr vert="horz" lIns="91440" tIns="45720" rIns="91440" bIns="45720" rtlCol="0"/>
-          <a:lstStyle/>
-          <a:p>
-            <a:pPr lvl="0"/>
-            <a:r>
-              <a:rPr lang="en-US" smtClean="0"/>
-              <a:t>Click to edit Master text styles</a:t>
-            </a:r>
-          </a:p>
-          <a:p>
-            <a:pPr lvl="1"/>
-            <a:r>
-              <a:rPr lang="en-US" smtClean="0"/>
-              <a:t>Second level</a:t>
-            </a:r>
-          </a:p>
-          <a:p>
-            <a:pPr lvl="2"/>
-            <a:r>
-              <a:rPr lang="en-US" smtClean="0"/>
-              <a:t>Third level</a:t>
-            </a:r>
-          </a:p>
-          <a:p>
-            <a:pPr lvl="3"/>
-            <a:r>
-              <a:rPr lang="en-US" smtClean="0"/>
-              <a:t>Fourth level</a:t>
-            </a:r>
-          </a:p>
-          <a:p>
-            <a:pPr lvl="4"/>
-            <a:r>
-              <a:rPr lang="en-US" smtClean="0"/>
-              <a:t>Fifth level</a:t>
-            </a:r>
-            <a:endParaRPr lang="en-US"/>
-          </a:p>
-        </p:txBody>
-      </p:sp>
-      <p:sp>
-        <p:nvSpPr>
-          <p:cNvPr id="6" name="Footer Placeholder 5"/>
-          <p:cNvSpPr>
-            <a:spLocks noGrp="1"/>
-          </p:cNvSpPr>
-          <p:nvPr>
-            <p:ph type="ftr" sz="quarter" idx="4"/>
-          </p:nvPr>
-        </p:nvSpPr>
-        <p:spPr>
-          <a:xfrm>
-            <a:off x="0" y="8685213"/>
-            <a:ext cx="2971800" cy="457200"/>
-          </a:xfrm>
-          <a:prstGeom prst="rect">
-            <a:avLst/>
-          </a:prstGeom>
-        </p:spPr>
-        <p:txBody>
-          <a:bodyPr vert="horz" lIns="91440" tIns="45720" rIns="91440" bIns="45720" rtlCol="0" anchor="b"/>
-          <a:lstStyle>
-            <a:lvl1pPr algn="l">
-              <a:defRPr sz="1200"/>
-            </a:lvl1pPr>
-          </a:lstStyle>
-          <a:p>
-            <a:endParaRPr lang="en-US"/>
-          </a:p>
-        </p:txBody>
-      </p:sp>
-      <p:sp>
-        <p:nvSpPr>
-          <p:cNvPr id="7" name="Slide Number Placeholder 6"/>
-          <p:cNvSpPr>
-            <a:spLocks noGrp="1"/>
-          </p:cNvSpPr>
-          <p:nvPr>
-            <p:ph type="sldNum" sz="quarter" idx="5"/>
-          </p:nvPr>
-        </p:nvSpPr>
-        <p:spPr>
-          <a:xfrm>
-            <a:off x="3884613" y="8685213"/>
-            <a:ext cx="2971800" cy="457200"/>
-          </a:xfrm>
-          <a:prstGeom prst="rect">
-            <a:avLst/>
-          </a:prstGeom>
-        </p:spPr>
-        <p:txBody>
-          <a:bodyPr vert="horz" lIns="91440" tIns="45720" rIns="91440" bIns="45720" rtlCol="0" anchor="b"/>
-          <a:lstStyle>
-            <a:lvl1pPr algn="r">
-              <a:defRPr sz="1200"/>
-            </a:lvl1pPr>
-          </a:lstStyle>
-          <a:p>
-            <a:fld id="{BB5E49A5-4136-284D-997B-48E1D791AD67}" type="slidenum">
-              <a:rPr lang="en-US" smtClean="0"/>
-              <a:t>‹#›</a:t>
-            </a:fld>
-            <a:endParaRPr lang="en-US"/>
-          </a:p>
-        </p:txBody>
-      </p:sp>
     </p:spTree>
     <p:extLst>
       <p:ext uri="{BB962C8B-B14F-4D97-AF65-F5344CB8AC3E}">
-        <p14:creationId xmlns:p14="http://schemas.microsoft.com/office/powerpoint/2010/main" val="2623252185"/>
+        <p14:creationId xmlns:p14="http://schemas.microsoft.com/office/powerpoint/2010/main" val="7199887"/>
       </p:ext>
     </p:extLst>
   </p:cSld>
   <p:clrMap bg1="lt1" tx1="dk1" bg2="lt2" tx2="dk2" accent1="accent1" accent2="accent2" accent3="accent3" accent4="accent4" accent5="accent5" accent6="accent6" hlink="hlink" folHlink="folHlink"/>
   <p:notesStyle>
-    <a:lvl1pPr marL="0" algn="l" defTabSz="457200" rtl="0" eaLnBrk="1" latinLnBrk="0" hangingPunct="1">
+    <a:lvl1pPr marL="0" algn="l" defTabSz="914400" rtl="0" eaLnBrk="1" latinLnBrk="0" hangingPunct="1">
       <a:defRPr sz="1200" kern="1200">
         <a:solidFill>
           <a:schemeClr val="tx1"/>
@@ -395,7 +189,7 @@
         <a:cs typeface="+mn-cs"/>
       </a:defRPr>
     </a:lvl1pPr>
-    <a:lvl2pPr marL="457200" algn="l" defTabSz="457200" rtl="0" eaLnBrk="1" latinLnBrk="0" hangingPunct="1">
+    <a:lvl2pPr marL="457200" algn="l" defTabSz="914400" rtl="0" eaLnBrk="1" latinLnBrk="0" hangingPunct="1">
       <a:defRPr sz="1200" kern="1200">
         <a:solidFill>
           <a:schemeClr val="tx1"/>
@@ -405,7 +199,7 @@
         <a:cs typeface="+mn-cs"/>
       </a:defRPr>
     </a:lvl2pPr>
-    <a:lvl3pPr marL="914400" algn="l" defTabSz="457200" rtl="0" eaLnBrk="1" latinLnBrk="0" hangingPunct="1">
+    <a:lvl3pPr marL="914400" algn="l" defTabSz="914400" rtl="0" eaLnBrk="1" latinLnBrk="0" hangingPunct="1">
       <a:defRPr sz="1200" kern="1200">
         <a:solidFill>
           <a:schemeClr val="tx1"/>
@@ -415,7 +209,7 @@
         <a:cs typeface="+mn-cs"/>
       </a:defRPr>
     </a:lvl3pPr>
-    <a:lvl4pPr marL="1371600" algn="l" defTabSz="457200" rtl="0" eaLnBrk="1" latinLnBrk="0" hangingPunct="1">
+    <a:lvl4pPr marL="1371600" algn="l" defTabSz="914400" rtl="0" eaLnBrk="1" latinLnBrk="0" hangingPunct="1">
       <a:defRPr sz="1200" kern="1200">
         <a:solidFill>
           <a:schemeClr val="tx1"/>
@@ -425,7 +219,7 @@
         <a:cs typeface="+mn-cs"/>
       </a:defRPr>
     </a:lvl4pPr>
-    <a:lvl5pPr marL="1828800" algn="l" defTabSz="457200" rtl="0" eaLnBrk="1" latinLnBrk="0" hangingPunct="1">
+    <a:lvl5pPr marL="1828800" algn="l" defTabSz="914400" rtl="0" eaLnBrk="1" latinLnBrk="0" hangingPunct="1">
       <a:defRPr sz="1200" kern="1200">
         <a:solidFill>
           <a:schemeClr val="tx1"/>
@@ -435,7 +229,7 @@
         <a:cs typeface="+mn-cs"/>
       </a:defRPr>
     </a:lvl5pPr>
-    <a:lvl6pPr marL="2286000" algn="l" defTabSz="457200" rtl="0" eaLnBrk="1" latinLnBrk="0" hangingPunct="1">
+    <a:lvl6pPr marL="2286000" algn="l" defTabSz="914400" rtl="0" eaLnBrk="1" latinLnBrk="0" hangingPunct="1">
       <a:defRPr sz="1200" kern="1200">
         <a:solidFill>
           <a:schemeClr val="tx1"/>
@@ -445,7 +239,7 @@
         <a:cs typeface="+mn-cs"/>
       </a:defRPr>
     </a:lvl6pPr>
-    <a:lvl7pPr marL="2743200" algn="l" defTabSz="457200" rtl="0" eaLnBrk="1" latinLnBrk="0" hangingPunct="1">
+    <a:lvl7pPr marL="2743200" algn="l" defTabSz="914400" rtl="0" eaLnBrk="1" latinLnBrk="0" hangingPunct="1">
       <a:defRPr sz="1200" kern="1200">
         <a:solidFill>
           <a:schemeClr val="tx1"/>
@@ -455,7 +249,7 @@
         <a:cs typeface="+mn-cs"/>
       </a:defRPr>
     </a:lvl7pPr>
-    <a:lvl8pPr marL="3200400" algn="l" defTabSz="457200" rtl="0" eaLnBrk="1" latinLnBrk="0" hangingPunct="1">
+    <a:lvl8pPr marL="3200400" algn="l" defTabSz="914400" rtl="0" eaLnBrk="1" latinLnBrk="0" hangingPunct="1">
       <a:defRPr sz="1200" kern="1200">
         <a:solidFill>
           <a:schemeClr val="tx1"/>
@@ -465,7 +259,7 @@
         <a:cs typeface="+mn-cs"/>
       </a:defRPr>
     </a:lvl8pPr>
-    <a:lvl9pPr marL="3657600" algn="l" defTabSz="457200" rtl="0" eaLnBrk="1" latinLnBrk="0" hangingPunct="1">
+    <a:lvl9pPr marL="3657600" algn="l" defTabSz="914400" rtl="0" eaLnBrk="1" latinLnBrk="0" hangingPunct="1">
       <a:defRPr sz="1200" kern="1200">
         <a:solidFill>
           <a:schemeClr val="tx1"/>
@@ -480,7 +274,7 @@
 </file>
 
 <file path=ppt/notesSlides/notesSlide1.xml><?xml version="1.0" encoding="utf-8"?>
-<p:notes xmlns:a="http://schemas.openxmlformats.org/drawingml/2006/main" xmlns:p="http://schemas.openxmlformats.org/presentationml/2006/main" xmlns:r="http://schemas.openxmlformats.org/officeDocument/2006/relationships">
+<p:notes xmlns:a="http://schemas.openxmlformats.org/drawingml/2006/main" xmlns:r="http://schemas.openxmlformats.org/officeDocument/2006/relationships" xmlns:p="http://schemas.openxmlformats.org/presentationml/2006/main">
   <p:cSld>
     <p:spTree>
       <p:nvGrpSpPr>
@@ -500,7 +294,7 @@
         <p:nvSpPr>
           <p:cNvPr id="2" name="Slide Image Placeholder 1"/>
           <p:cNvSpPr>
-            <a:spLocks noGrp="1"/>
+            <a:spLocks noGrp="1" noRot="1" noChangeAspect="1"/>
           </p:cNvSpPr>
           <p:nvPr>
             <p:ph type="sldImg" idx="2"/>
@@ -515,7 +309,7 @@
             <a:spLocks noGrp="1"/>
           </p:cNvSpPr>
           <p:nvPr>
-            <p:ph type="body" idx="3" sz="quarter"/>
+            <p:ph type="body" sz="quarter" idx="3"/>
           </p:nvPr>
         </p:nvSpPr>
         <p:spPr/>
@@ -536,7 +330,7 @@
             <a:spLocks noGrp="1"/>
           </p:cNvSpPr>
           <p:nvPr>
-            <p:ph type="sldNum" idx="5" sz="quarter"/>
+            <p:ph type="sldNum" sz="quarter" idx="5"/>
           </p:nvPr>
         </p:nvSpPr>
         <p:spPr/>
@@ -550,7 +344,7 @@
 </file>
 
 <file path=ppt/notesSlides/notesSlide10.xml><?xml version="1.0" encoding="utf-8"?>
-<p:notes xmlns:a="http://schemas.openxmlformats.org/drawingml/2006/main" xmlns:p="http://schemas.openxmlformats.org/presentationml/2006/main" xmlns:r="http://schemas.openxmlformats.org/officeDocument/2006/relationships">
+<p:notes xmlns:a="http://schemas.openxmlformats.org/drawingml/2006/main" xmlns:r="http://schemas.openxmlformats.org/officeDocument/2006/relationships" xmlns:p="http://schemas.openxmlformats.org/presentationml/2006/main">
   <p:cSld>
     <p:spTree>
       <p:nvGrpSpPr>
@@ -570,7 +364,7 @@
         <p:nvSpPr>
           <p:cNvPr id="2" name="Slide Image Placeholder 1"/>
           <p:cNvSpPr>
-            <a:spLocks noGrp="1"/>
+            <a:spLocks noGrp="1" noRot="1" noChangeAspect="1"/>
           </p:cNvSpPr>
           <p:nvPr>
             <p:ph type="sldImg" idx="2"/>
@@ -585,7 +379,7 @@
             <a:spLocks noGrp="1"/>
           </p:cNvSpPr>
           <p:nvPr>
-            <p:ph type="body" idx="3" sz="quarter"/>
+            <p:ph type="body" sz="quarter" idx="3"/>
           </p:nvPr>
         </p:nvSpPr>
         <p:spPr/>
@@ -606,7 +400,7 @@
             <a:spLocks noGrp="1"/>
           </p:cNvSpPr>
           <p:nvPr>
-            <p:ph type="sldNum" idx="5" sz="quarter"/>
+            <p:ph type="sldNum" sz="quarter" idx="5"/>
           </p:nvPr>
         </p:nvSpPr>
         <p:spPr/>
@@ -620,7 +414,7 @@
 </file>
 
 <file path=ppt/notesSlides/notesSlide11.xml><?xml version="1.0" encoding="utf-8"?>
-<p:notes xmlns:a="http://schemas.openxmlformats.org/drawingml/2006/main" xmlns:p="http://schemas.openxmlformats.org/presentationml/2006/main" xmlns:r="http://schemas.openxmlformats.org/officeDocument/2006/relationships">
+<p:notes xmlns:a="http://schemas.openxmlformats.org/drawingml/2006/main" xmlns:r="http://schemas.openxmlformats.org/officeDocument/2006/relationships" xmlns:p="http://schemas.openxmlformats.org/presentationml/2006/main">
   <p:cSld>
     <p:spTree>
       <p:nvGrpSpPr>
@@ -640,7 +434,7 @@
         <p:nvSpPr>
           <p:cNvPr id="2" name="Slide Image Placeholder 1"/>
           <p:cNvSpPr>
-            <a:spLocks noGrp="1"/>
+            <a:spLocks noGrp="1" noRot="1" noChangeAspect="1"/>
           </p:cNvSpPr>
           <p:nvPr>
             <p:ph type="sldImg" idx="2"/>
@@ -655,7 +449,7 @@
             <a:spLocks noGrp="1"/>
           </p:cNvSpPr>
           <p:nvPr>
-            <p:ph type="body" idx="3" sz="quarter"/>
+            <p:ph type="body" sz="quarter" idx="3"/>
           </p:nvPr>
         </p:nvSpPr>
         <p:spPr/>
@@ -676,7 +470,7 @@
             <a:spLocks noGrp="1"/>
           </p:cNvSpPr>
           <p:nvPr>
-            <p:ph type="sldNum" idx="5" sz="quarter"/>
+            <p:ph type="sldNum" sz="quarter" idx="5"/>
           </p:nvPr>
         </p:nvSpPr>
         <p:spPr/>
@@ -690,7 +484,7 @@
 </file>
 
 <file path=ppt/notesSlides/notesSlide12.xml><?xml version="1.0" encoding="utf-8"?>
-<p:notes xmlns:a="http://schemas.openxmlformats.org/drawingml/2006/main" xmlns:p="http://schemas.openxmlformats.org/presentationml/2006/main" xmlns:r="http://schemas.openxmlformats.org/officeDocument/2006/relationships">
+<p:notes xmlns:a="http://schemas.openxmlformats.org/drawingml/2006/main" xmlns:r="http://schemas.openxmlformats.org/officeDocument/2006/relationships" xmlns:p="http://schemas.openxmlformats.org/presentationml/2006/main">
   <p:cSld>
     <p:spTree>
       <p:nvGrpSpPr>
@@ -710,7 +504,7 @@
         <p:nvSpPr>
           <p:cNvPr id="2" name="Slide Image Placeholder 1"/>
           <p:cNvSpPr>
-            <a:spLocks noGrp="1"/>
+            <a:spLocks noGrp="1" noRot="1" noChangeAspect="1"/>
           </p:cNvSpPr>
           <p:nvPr>
             <p:ph type="sldImg" idx="2"/>
@@ -725,7 +519,7 @@
             <a:spLocks noGrp="1"/>
           </p:cNvSpPr>
           <p:nvPr>
-            <p:ph type="body" idx="3" sz="quarter"/>
+            <p:ph type="body" sz="quarter" idx="3"/>
           </p:nvPr>
         </p:nvSpPr>
         <p:spPr/>
@@ -746,7 +540,7 @@
             <a:spLocks noGrp="1"/>
           </p:cNvSpPr>
           <p:nvPr>
-            <p:ph type="sldNum" idx="5" sz="quarter"/>
+            <p:ph type="sldNum" sz="quarter" idx="5"/>
           </p:nvPr>
         </p:nvSpPr>
         <p:spPr/>
@@ -760,7 +554,7 @@
 </file>
 
 <file path=ppt/notesSlides/notesSlide13.xml><?xml version="1.0" encoding="utf-8"?>
-<p:notes xmlns:a="http://schemas.openxmlformats.org/drawingml/2006/main" xmlns:p="http://schemas.openxmlformats.org/presentationml/2006/main" xmlns:r="http://schemas.openxmlformats.org/officeDocument/2006/relationships">
+<p:notes xmlns:a="http://schemas.openxmlformats.org/drawingml/2006/main" xmlns:r="http://schemas.openxmlformats.org/officeDocument/2006/relationships" xmlns:p="http://schemas.openxmlformats.org/presentationml/2006/main">
   <p:cSld>
     <p:spTree>
       <p:nvGrpSpPr>
@@ -780,7 +574,7 @@
         <p:nvSpPr>
           <p:cNvPr id="2" name="Slide Image Placeholder 1"/>
           <p:cNvSpPr>
-            <a:spLocks noGrp="1"/>
+            <a:spLocks noGrp="1" noRot="1" noChangeAspect="1"/>
           </p:cNvSpPr>
           <p:nvPr>
             <p:ph type="sldImg" idx="2"/>
@@ -795,7 +589,7 @@
             <a:spLocks noGrp="1"/>
           </p:cNvSpPr>
           <p:nvPr>
-            <p:ph type="body" idx="3" sz="quarter"/>
+            <p:ph type="body" sz="quarter" idx="3"/>
           </p:nvPr>
         </p:nvSpPr>
         <p:spPr/>
@@ -816,7 +610,7 @@
             <a:spLocks noGrp="1"/>
           </p:cNvSpPr>
           <p:nvPr>
-            <p:ph type="sldNum" idx="5" sz="quarter"/>
+            <p:ph type="sldNum" sz="quarter" idx="5"/>
           </p:nvPr>
         </p:nvSpPr>
         <p:spPr/>
@@ -830,7 +624,7 @@
 </file>
 
 <file path=ppt/notesSlides/notesSlide14.xml><?xml version="1.0" encoding="utf-8"?>
-<p:notes xmlns:a="http://schemas.openxmlformats.org/drawingml/2006/main" xmlns:p="http://schemas.openxmlformats.org/presentationml/2006/main" xmlns:r="http://schemas.openxmlformats.org/officeDocument/2006/relationships">
+<p:notes xmlns:a="http://schemas.openxmlformats.org/drawingml/2006/main" xmlns:r="http://schemas.openxmlformats.org/officeDocument/2006/relationships" xmlns:p="http://schemas.openxmlformats.org/presentationml/2006/main">
   <p:cSld>
     <p:spTree>
       <p:nvGrpSpPr>
@@ -850,7 +644,7 @@
         <p:nvSpPr>
           <p:cNvPr id="2" name="Slide Image Placeholder 1"/>
           <p:cNvSpPr>
-            <a:spLocks noGrp="1"/>
+            <a:spLocks noGrp="1" noRot="1" noChangeAspect="1"/>
           </p:cNvSpPr>
           <p:nvPr>
             <p:ph type="sldImg" idx="2"/>
@@ -865,7 +659,7 @@
             <a:spLocks noGrp="1"/>
           </p:cNvSpPr>
           <p:nvPr>
-            <p:ph type="body" idx="3" sz="quarter"/>
+            <p:ph type="body" sz="quarter" idx="3"/>
           </p:nvPr>
         </p:nvSpPr>
         <p:spPr/>
@@ -886,7 +680,7 @@
             <a:spLocks noGrp="1"/>
           </p:cNvSpPr>
           <p:nvPr>
-            <p:ph type="sldNum" idx="5" sz="quarter"/>
+            <p:ph type="sldNum" sz="quarter" idx="5"/>
           </p:nvPr>
         </p:nvSpPr>
         <p:spPr/>
@@ -900,7 +694,7 @@
 </file>
 
 <file path=ppt/notesSlides/notesSlide15.xml><?xml version="1.0" encoding="utf-8"?>
-<p:notes xmlns:a="http://schemas.openxmlformats.org/drawingml/2006/main" xmlns:p="http://schemas.openxmlformats.org/presentationml/2006/main" xmlns:r="http://schemas.openxmlformats.org/officeDocument/2006/relationships">
+<p:notes xmlns:a="http://schemas.openxmlformats.org/drawingml/2006/main" xmlns:r="http://schemas.openxmlformats.org/officeDocument/2006/relationships" xmlns:p="http://schemas.openxmlformats.org/presentationml/2006/main">
   <p:cSld>
     <p:spTree>
       <p:nvGrpSpPr>
@@ -920,7 +714,7 @@
         <p:nvSpPr>
           <p:cNvPr id="2" name="Slide Image Placeholder 1"/>
           <p:cNvSpPr>
-            <a:spLocks noGrp="1"/>
+            <a:spLocks noGrp="1" noRot="1" noChangeAspect="1"/>
           </p:cNvSpPr>
           <p:nvPr>
             <p:ph type="sldImg" idx="2"/>
@@ -935,7 +729,7 @@
             <a:spLocks noGrp="1"/>
           </p:cNvSpPr>
           <p:nvPr>
-            <p:ph type="body" idx="3" sz="quarter"/>
+            <p:ph type="body" sz="quarter" idx="3"/>
           </p:nvPr>
         </p:nvSpPr>
         <p:spPr/>
@@ -956,7 +750,7 @@
             <a:spLocks noGrp="1"/>
           </p:cNvSpPr>
           <p:nvPr>
-            <p:ph type="sldNum" idx="5" sz="quarter"/>
+            <p:ph type="sldNum" sz="quarter" idx="5"/>
           </p:nvPr>
         </p:nvSpPr>
         <p:spPr/>
@@ -970,7 +764,7 @@
 </file>
 
 <file path=ppt/notesSlides/notesSlide16.xml><?xml version="1.0" encoding="utf-8"?>
-<p:notes xmlns:a="http://schemas.openxmlformats.org/drawingml/2006/main" xmlns:p="http://schemas.openxmlformats.org/presentationml/2006/main" xmlns:r="http://schemas.openxmlformats.org/officeDocument/2006/relationships">
+<p:notes xmlns:a="http://schemas.openxmlformats.org/drawingml/2006/main" xmlns:r="http://schemas.openxmlformats.org/officeDocument/2006/relationships" xmlns:p="http://schemas.openxmlformats.org/presentationml/2006/main">
   <p:cSld>
     <p:spTree>
       <p:nvGrpSpPr>
@@ -990,7 +784,7 @@
         <p:nvSpPr>
           <p:cNvPr id="2" name="Slide Image Placeholder 1"/>
           <p:cNvSpPr>
-            <a:spLocks noGrp="1"/>
+            <a:spLocks noGrp="1" noRot="1" noChangeAspect="1"/>
           </p:cNvSpPr>
           <p:nvPr>
             <p:ph type="sldImg" idx="2"/>
@@ -1005,7 +799,7 @@
             <a:spLocks noGrp="1"/>
           </p:cNvSpPr>
           <p:nvPr>
-            <p:ph type="body" idx="3" sz="quarter"/>
+            <p:ph type="body" sz="quarter" idx="3"/>
           </p:nvPr>
         </p:nvSpPr>
         <p:spPr/>
@@ -1026,7 +820,7 @@
             <a:spLocks noGrp="1"/>
           </p:cNvSpPr>
           <p:nvPr>
-            <p:ph type="sldNum" idx="5" sz="quarter"/>
+            <p:ph type="sldNum" sz="quarter" idx="5"/>
           </p:nvPr>
         </p:nvSpPr>
         <p:spPr/>
@@ -1040,7 +834,7 @@
 </file>
 
 <file path=ppt/notesSlides/notesSlide17.xml><?xml version="1.0" encoding="utf-8"?>
-<p:notes xmlns:a="http://schemas.openxmlformats.org/drawingml/2006/main" xmlns:p="http://schemas.openxmlformats.org/presentationml/2006/main" xmlns:r="http://schemas.openxmlformats.org/officeDocument/2006/relationships">
+<p:notes xmlns:a="http://schemas.openxmlformats.org/drawingml/2006/main" xmlns:r="http://schemas.openxmlformats.org/officeDocument/2006/relationships" xmlns:p="http://schemas.openxmlformats.org/presentationml/2006/main">
   <p:cSld>
     <p:spTree>
       <p:nvGrpSpPr>
@@ -1060,7 +854,7 @@
         <p:nvSpPr>
           <p:cNvPr id="2" name="Slide Image Placeholder 1"/>
           <p:cNvSpPr>
-            <a:spLocks noGrp="1"/>
+            <a:spLocks noGrp="1" noRot="1" noChangeAspect="1"/>
           </p:cNvSpPr>
           <p:nvPr>
             <p:ph type="sldImg" idx="2"/>
@@ -1075,7 +869,7 @@
             <a:spLocks noGrp="1"/>
           </p:cNvSpPr>
           <p:nvPr>
-            <p:ph type="body" idx="3" sz="quarter"/>
+            <p:ph type="body" sz="quarter" idx="3"/>
           </p:nvPr>
         </p:nvSpPr>
         <p:spPr/>
@@ -1096,7 +890,7 @@
             <a:spLocks noGrp="1"/>
           </p:cNvSpPr>
           <p:nvPr>
-            <p:ph type="sldNum" idx="5" sz="quarter"/>
+            <p:ph type="sldNum" sz="quarter" idx="5"/>
           </p:nvPr>
         </p:nvSpPr>
         <p:spPr/>
@@ -1110,7 +904,7 @@
 </file>
 
 <file path=ppt/notesSlides/notesSlide18.xml><?xml version="1.0" encoding="utf-8"?>
-<p:notes xmlns:a="http://schemas.openxmlformats.org/drawingml/2006/main" xmlns:p="http://schemas.openxmlformats.org/presentationml/2006/main" xmlns:r="http://schemas.openxmlformats.org/officeDocument/2006/relationships">
+<p:notes xmlns:a="http://schemas.openxmlformats.org/drawingml/2006/main" xmlns:r="http://schemas.openxmlformats.org/officeDocument/2006/relationships" xmlns:p="http://schemas.openxmlformats.org/presentationml/2006/main">
   <p:cSld>
     <p:spTree>
       <p:nvGrpSpPr>
@@ -1130,7 +924,7 @@
         <p:nvSpPr>
           <p:cNvPr id="2" name="Slide Image Placeholder 1"/>
           <p:cNvSpPr>
-            <a:spLocks noGrp="1"/>
+            <a:spLocks noGrp="1" noRot="1" noChangeAspect="1"/>
           </p:cNvSpPr>
           <p:nvPr>
             <p:ph type="sldImg" idx="2"/>
@@ -1145,7 +939,7 @@
             <a:spLocks noGrp="1"/>
           </p:cNvSpPr>
           <p:nvPr>
-            <p:ph type="body" idx="3" sz="quarter"/>
+            <p:ph type="body" sz="quarter" idx="3"/>
           </p:nvPr>
         </p:nvSpPr>
         <p:spPr/>
@@ -1166,7 +960,7 @@
             <a:spLocks noGrp="1"/>
           </p:cNvSpPr>
           <p:nvPr>
-            <p:ph type="sldNum" idx="5" sz="quarter"/>
+            <p:ph type="sldNum" sz="quarter" idx="5"/>
           </p:nvPr>
         </p:nvSpPr>
         <p:spPr/>
@@ -1180,7 +974,7 @@
 </file>
 
 <file path=ppt/notesSlides/notesSlide19.xml><?xml version="1.0" encoding="utf-8"?>
-<p:notes xmlns:a="http://schemas.openxmlformats.org/drawingml/2006/main" xmlns:p="http://schemas.openxmlformats.org/presentationml/2006/main" xmlns:r="http://schemas.openxmlformats.org/officeDocument/2006/relationships">
+<p:notes xmlns:a="http://schemas.openxmlformats.org/drawingml/2006/main" xmlns:r="http://schemas.openxmlformats.org/officeDocument/2006/relationships" xmlns:p="http://schemas.openxmlformats.org/presentationml/2006/main">
   <p:cSld>
     <p:spTree>
       <p:nvGrpSpPr>
@@ -1200,7 +994,7 @@
         <p:nvSpPr>
           <p:cNvPr id="2" name="Slide Image Placeholder 1"/>
           <p:cNvSpPr>
-            <a:spLocks noGrp="1"/>
+            <a:spLocks noGrp="1" noRot="1" noChangeAspect="1"/>
           </p:cNvSpPr>
           <p:nvPr>
             <p:ph type="sldImg" idx="2"/>
@@ -1215,7 +1009,7 @@
             <a:spLocks noGrp="1"/>
           </p:cNvSpPr>
           <p:nvPr>
-            <p:ph type="body" idx="3" sz="quarter"/>
+            <p:ph type="body" sz="quarter" idx="3"/>
           </p:nvPr>
         </p:nvSpPr>
         <p:spPr/>
@@ -1236,7 +1030,7 @@
             <a:spLocks noGrp="1"/>
           </p:cNvSpPr>
           <p:nvPr>
-            <p:ph type="sldNum" idx="5" sz="quarter"/>
+            <p:ph type="sldNum" sz="quarter" idx="5"/>
           </p:nvPr>
         </p:nvSpPr>
         <p:spPr/>
@@ -1250,7 +1044,7 @@
 </file>
 
 <file path=ppt/notesSlides/notesSlide2.xml><?xml version="1.0" encoding="utf-8"?>
-<p:notes xmlns:a="http://schemas.openxmlformats.org/drawingml/2006/main" xmlns:p="http://schemas.openxmlformats.org/presentationml/2006/main" xmlns:r="http://schemas.openxmlformats.org/officeDocument/2006/relationships">
+<p:notes xmlns:a="http://schemas.openxmlformats.org/drawingml/2006/main" xmlns:r="http://schemas.openxmlformats.org/officeDocument/2006/relationships" xmlns:p="http://schemas.openxmlformats.org/presentationml/2006/main">
   <p:cSld>
     <p:spTree>
       <p:nvGrpSpPr>
@@ -1270,7 +1064,7 @@
         <p:nvSpPr>
           <p:cNvPr id="2" name="Slide Image Placeholder 1"/>
           <p:cNvSpPr>
-            <a:spLocks noGrp="1"/>
+            <a:spLocks noGrp="1" noRot="1" noChangeAspect="1"/>
           </p:cNvSpPr>
           <p:nvPr>
             <p:ph type="sldImg" idx="2"/>
@@ -1285,7 +1079,7 @@
             <a:spLocks noGrp="1"/>
           </p:cNvSpPr>
           <p:nvPr>
-            <p:ph type="body" idx="3" sz="quarter"/>
+            <p:ph type="body" sz="quarter" idx="3"/>
           </p:nvPr>
         </p:nvSpPr>
         <p:spPr/>
@@ -1306,7 +1100,7 @@
             <a:spLocks noGrp="1"/>
           </p:cNvSpPr>
           <p:nvPr>
-            <p:ph type="sldNum" idx="5" sz="quarter"/>
+            <p:ph type="sldNum" sz="quarter" idx="5"/>
           </p:nvPr>
         </p:nvSpPr>
         <p:spPr/>
@@ -1320,7 +1114,7 @@
 </file>
 
 <file path=ppt/notesSlides/notesSlide20.xml><?xml version="1.0" encoding="utf-8"?>
-<p:notes xmlns:a="http://schemas.openxmlformats.org/drawingml/2006/main" xmlns:p="http://schemas.openxmlformats.org/presentationml/2006/main" xmlns:r="http://schemas.openxmlformats.org/officeDocument/2006/relationships">
+<p:notes xmlns:a="http://schemas.openxmlformats.org/drawingml/2006/main" xmlns:r="http://schemas.openxmlformats.org/officeDocument/2006/relationships" xmlns:p="http://schemas.openxmlformats.org/presentationml/2006/main">
   <p:cSld>
     <p:spTree>
       <p:nvGrpSpPr>
@@ -1340,7 +1134,7 @@
         <p:nvSpPr>
           <p:cNvPr id="2" name="Slide Image Placeholder 1"/>
           <p:cNvSpPr>
-            <a:spLocks noGrp="1"/>
+            <a:spLocks noGrp="1" noRot="1" noChangeAspect="1"/>
           </p:cNvSpPr>
           <p:nvPr>
             <p:ph type="sldImg" idx="2"/>
@@ -1355,7 +1149,7 @@
             <a:spLocks noGrp="1"/>
           </p:cNvSpPr>
           <p:nvPr>
-            <p:ph type="body" idx="3" sz="quarter"/>
+            <p:ph type="body" sz="quarter" idx="3"/>
           </p:nvPr>
         </p:nvSpPr>
         <p:spPr/>
@@ -1376,7 +1170,7 @@
             <a:spLocks noGrp="1"/>
           </p:cNvSpPr>
           <p:nvPr>
-            <p:ph type="sldNum" idx="5" sz="quarter"/>
+            <p:ph type="sldNum" sz="quarter" idx="5"/>
           </p:nvPr>
         </p:nvSpPr>
         <p:spPr/>
@@ -1390,7 +1184,7 @@
 </file>
 
 <file path=ppt/notesSlides/notesSlide21.xml><?xml version="1.0" encoding="utf-8"?>
-<p:notes xmlns:a="http://schemas.openxmlformats.org/drawingml/2006/main" xmlns:p="http://schemas.openxmlformats.org/presentationml/2006/main" xmlns:r="http://schemas.openxmlformats.org/officeDocument/2006/relationships">
+<p:notes xmlns:a="http://schemas.openxmlformats.org/drawingml/2006/main" xmlns:r="http://schemas.openxmlformats.org/officeDocument/2006/relationships" xmlns:p="http://schemas.openxmlformats.org/presentationml/2006/main">
   <p:cSld>
     <p:spTree>
       <p:nvGrpSpPr>
@@ -1410,7 +1204,7 @@
         <p:nvSpPr>
           <p:cNvPr id="2" name="Slide Image Placeholder 1"/>
           <p:cNvSpPr>
-            <a:spLocks noGrp="1"/>
+            <a:spLocks noGrp="1" noRot="1" noChangeAspect="1"/>
           </p:cNvSpPr>
           <p:nvPr>
             <p:ph type="sldImg" idx="2"/>
@@ -1425,7 +1219,7 @@
             <a:spLocks noGrp="1"/>
           </p:cNvSpPr>
           <p:nvPr>
-            <p:ph type="body" idx="3" sz="quarter"/>
+            <p:ph type="body" sz="quarter" idx="3"/>
           </p:nvPr>
         </p:nvSpPr>
         <p:spPr/>
@@ -1446,7 +1240,7 @@
             <a:spLocks noGrp="1"/>
           </p:cNvSpPr>
           <p:nvPr>
-            <p:ph type="sldNum" idx="5" sz="quarter"/>
+            <p:ph type="sldNum" sz="quarter" idx="5"/>
           </p:nvPr>
         </p:nvSpPr>
         <p:spPr/>
@@ -1460,7 +1254,7 @@
 </file>
 
 <file path=ppt/notesSlides/notesSlide3.xml><?xml version="1.0" encoding="utf-8"?>
-<p:notes xmlns:a="http://schemas.openxmlformats.org/drawingml/2006/main" xmlns:p="http://schemas.openxmlformats.org/presentationml/2006/main" xmlns:r="http://schemas.openxmlformats.org/officeDocument/2006/relationships">
+<p:notes xmlns:a="http://schemas.openxmlformats.org/drawingml/2006/main" xmlns:r="http://schemas.openxmlformats.org/officeDocument/2006/relationships" xmlns:p="http://schemas.openxmlformats.org/presentationml/2006/main">
   <p:cSld>
     <p:spTree>
       <p:nvGrpSpPr>
@@ -1480,7 +1274,7 @@
         <p:nvSpPr>
           <p:cNvPr id="2" name="Slide Image Placeholder 1"/>
           <p:cNvSpPr>
-            <a:spLocks noGrp="1"/>
+            <a:spLocks noGrp="1" noRot="1" noChangeAspect="1"/>
           </p:cNvSpPr>
           <p:nvPr>
             <p:ph type="sldImg" idx="2"/>
@@ -1495,7 +1289,7 @@
             <a:spLocks noGrp="1"/>
           </p:cNvSpPr>
           <p:nvPr>
-            <p:ph type="body" idx="3" sz="quarter"/>
+            <p:ph type="body" sz="quarter" idx="3"/>
           </p:nvPr>
         </p:nvSpPr>
         <p:spPr/>
@@ -1516,7 +1310,7 @@
             <a:spLocks noGrp="1"/>
           </p:cNvSpPr>
           <p:nvPr>
-            <p:ph type="sldNum" idx="5" sz="quarter"/>
+            <p:ph type="sldNum" sz="quarter" idx="5"/>
           </p:nvPr>
         </p:nvSpPr>
         <p:spPr/>
@@ -1530,7 +1324,7 @@
 </file>
 
 <file path=ppt/notesSlides/notesSlide4.xml><?xml version="1.0" encoding="utf-8"?>
-<p:notes xmlns:a="http://schemas.openxmlformats.org/drawingml/2006/main" xmlns:p="http://schemas.openxmlformats.org/presentationml/2006/main" xmlns:r="http://schemas.openxmlformats.org/officeDocument/2006/relationships">
+<p:notes xmlns:a="http://schemas.openxmlformats.org/drawingml/2006/main" xmlns:r="http://schemas.openxmlformats.org/officeDocument/2006/relationships" xmlns:p="http://schemas.openxmlformats.org/presentationml/2006/main">
   <p:cSld>
     <p:spTree>
       <p:nvGrpSpPr>
@@ -1550,7 +1344,7 @@
         <p:nvSpPr>
           <p:cNvPr id="2" name="Slide Image Placeholder 1"/>
           <p:cNvSpPr>
-            <a:spLocks noGrp="1"/>
+            <a:spLocks noGrp="1" noRot="1" noChangeAspect="1"/>
           </p:cNvSpPr>
           <p:nvPr>
             <p:ph type="sldImg" idx="2"/>
@@ -1565,7 +1359,7 @@
             <a:spLocks noGrp="1"/>
           </p:cNvSpPr>
           <p:nvPr>
-            <p:ph type="body" idx="3" sz="quarter"/>
+            <p:ph type="body" sz="quarter" idx="3"/>
           </p:nvPr>
         </p:nvSpPr>
         <p:spPr/>
@@ -1586,7 +1380,7 @@
             <a:spLocks noGrp="1"/>
           </p:cNvSpPr>
           <p:nvPr>
-            <p:ph type="sldNum" idx="5" sz="quarter"/>
+            <p:ph type="sldNum" sz="quarter" idx="5"/>
           </p:nvPr>
         </p:nvSpPr>
         <p:spPr/>
@@ -1600,7 +1394,7 @@
 </file>
 
 <file path=ppt/notesSlides/notesSlide5.xml><?xml version="1.0" encoding="utf-8"?>
-<p:notes xmlns:a="http://schemas.openxmlformats.org/drawingml/2006/main" xmlns:p="http://schemas.openxmlformats.org/presentationml/2006/main" xmlns:r="http://schemas.openxmlformats.org/officeDocument/2006/relationships">
+<p:notes xmlns:a="http://schemas.openxmlformats.org/drawingml/2006/main" xmlns:r="http://schemas.openxmlformats.org/officeDocument/2006/relationships" xmlns:p="http://schemas.openxmlformats.org/presentationml/2006/main">
   <p:cSld>
     <p:spTree>
       <p:nvGrpSpPr>
@@ -1620,7 +1414,7 @@
         <p:nvSpPr>
           <p:cNvPr id="2" name="Slide Image Placeholder 1"/>
           <p:cNvSpPr>
-            <a:spLocks noGrp="1"/>
+            <a:spLocks noGrp="1" noRot="1" noChangeAspect="1"/>
           </p:cNvSpPr>
           <p:nvPr>
             <p:ph type="sldImg" idx="2"/>
@@ -1635,7 +1429,7 @@
             <a:spLocks noGrp="1"/>
           </p:cNvSpPr>
           <p:nvPr>
-            <p:ph type="body" idx="3" sz="quarter"/>
+            <p:ph type="body" sz="quarter" idx="3"/>
           </p:nvPr>
         </p:nvSpPr>
         <p:spPr/>
@@ -1656,7 +1450,7 @@
             <a:spLocks noGrp="1"/>
           </p:cNvSpPr>
           <p:nvPr>
-            <p:ph type="sldNum" idx="5" sz="quarter"/>
+            <p:ph type="sldNum" sz="quarter" idx="5"/>
           </p:nvPr>
         </p:nvSpPr>
         <p:spPr/>
@@ -1670,7 +1464,7 @@
 </file>
 
 <file path=ppt/notesSlides/notesSlide6.xml><?xml version="1.0" encoding="utf-8"?>
-<p:notes xmlns:a="http://schemas.openxmlformats.org/drawingml/2006/main" xmlns:p="http://schemas.openxmlformats.org/presentationml/2006/main" xmlns:r="http://schemas.openxmlformats.org/officeDocument/2006/relationships">
+<p:notes xmlns:a="http://schemas.openxmlformats.org/drawingml/2006/main" xmlns:r="http://schemas.openxmlformats.org/officeDocument/2006/relationships" xmlns:p="http://schemas.openxmlformats.org/presentationml/2006/main">
   <p:cSld>
     <p:spTree>
       <p:nvGrpSpPr>
@@ -1690,7 +1484,7 @@
         <p:nvSpPr>
           <p:cNvPr id="2" name="Slide Image Placeholder 1"/>
           <p:cNvSpPr>
-            <a:spLocks noGrp="1"/>
+            <a:spLocks noGrp="1" noRot="1" noChangeAspect="1"/>
           </p:cNvSpPr>
           <p:nvPr>
             <p:ph type="sldImg" idx="2"/>
@@ -1705,7 +1499,7 @@
             <a:spLocks noGrp="1"/>
           </p:cNvSpPr>
           <p:nvPr>
-            <p:ph type="body" idx="3" sz="quarter"/>
+            <p:ph type="body" sz="quarter" idx="3"/>
           </p:nvPr>
         </p:nvSpPr>
         <p:spPr/>
@@ -1726,7 +1520,7 @@
             <a:spLocks noGrp="1"/>
           </p:cNvSpPr>
           <p:nvPr>
-            <p:ph type="sldNum" idx="5" sz="quarter"/>
+            <p:ph type="sldNum" sz="quarter" idx="5"/>
           </p:nvPr>
         </p:nvSpPr>
         <p:spPr/>
@@ -1740,7 +1534,7 @@
 </file>
 
 <file path=ppt/notesSlides/notesSlide7.xml><?xml version="1.0" encoding="utf-8"?>
-<p:notes xmlns:a="http://schemas.openxmlformats.org/drawingml/2006/main" xmlns:p="http://schemas.openxmlformats.org/presentationml/2006/main" xmlns:r="http://schemas.openxmlformats.org/officeDocument/2006/relationships">
+<p:notes xmlns:a="http://schemas.openxmlformats.org/drawingml/2006/main" xmlns:r="http://schemas.openxmlformats.org/officeDocument/2006/relationships" xmlns:p="http://schemas.openxmlformats.org/presentationml/2006/main">
   <p:cSld>
     <p:spTree>
       <p:nvGrpSpPr>
@@ -1760,7 +1554,7 @@
         <p:nvSpPr>
           <p:cNvPr id="2" name="Slide Image Placeholder 1"/>
           <p:cNvSpPr>
-            <a:spLocks noGrp="1"/>
+            <a:spLocks noGrp="1" noRot="1" noChangeAspect="1"/>
           </p:cNvSpPr>
           <p:nvPr>
             <p:ph type="sldImg" idx="2"/>
@@ -1775,7 +1569,7 @@
             <a:spLocks noGrp="1"/>
           </p:cNvSpPr>
           <p:nvPr>
-            <p:ph type="body" idx="3" sz="quarter"/>
+            <p:ph type="body" sz="quarter" idx="3"/>
           </p:nvPr>
         </p:nvSpPr>
         <p:spPr/>
@@ -1796,7 +1590,7 @@
             <a:spLocks noGrp="1"/>
           </p:cNvSpPr>
           <p:nvPr>
-            <p:ph type="sldNum" idx="5" sz="quarter"/>
+            <p:ph type="sldNum" sz="quarter" idx="5"/>
           </p:nvPr>
         </p:nvSpPr>
         <p:spPr/>
@@ -1810,7 +1604,7 @@
 </file>
 
 <file path=ppt/notesSlides/notesSlide8.xml><?xml version="1.0" encoding="utf-8"?>
-<p:notes xmlns:a="http://schemas.openxmlformats.org/drawingml/2006/main" xmlns:p="http://schemas.openxmlformats.org/presentationml/2006/main" xmlns:r="http://schemas.openxmlformats.org/officeDocument/2006/relationships">
+<p:notes xmlns:a="http://schemas.openxmlformats.org/drawingml/2006/main" xmlns:r="http://schemas.openxmlformats.org/officeDocument/2006/relationships" xmlns:p="http://schemas.openxmlformats.org/presentationml/2006/main">
   <p:cSld>
     <p:spTree>
       <p:nvGrpSpPr>
@@ -1830,7 +1624,7 @@
         <p:nvSpPr>
           <p:cNvPr id="2" name="Slide Image Placeholder 1"/>
           <p:cNvSpPr>
-            <a:spLocks noGrp="1"/>
+            <a:spLocks noGrp="1" noRot="1" noChangeAspect="1"/>
           </p:cNvSpPr>
           <p:nvPr>
             <p:ph type="sldImg" idx="2"/>
@@ -1845,7 +1639,7 @@
             <a:spLocks noGrp="1"/>
           </p:cNvSpPr>
           <p:nvPr>
-            <p:ph type="body" idx="3" sz="quarter"/>
+            <p:ph type="body" sz="quarter" idx="3"/>
           </p:nvPr>
         </p:nvSpPr>
         <p:spPr/>
@@ -1866,7 +1660,7 @@
             <a:spLocks noGrp="1"/>
           </p:cNvSpPr>
           <p:nvPr>
-            <p:ph type="sldNum" idx="5" sz="quarter"/>
+            <p:ph type="sldNum" sz="quarter" idx="5"/>
           </p:nvPr>
         </p:nvSpPr>
         <p:spPr/>
@@ -1880,7 +1674,7 @@
 </file>
 
 <file path=ppt/notesSlides/notesSlide9.xml><?xml version="1.0" encoding="utf-8"?>
-<p:notes xmlns:a="http://schemas.openxmlformats.org/drawingml/2006/main" xmlns:p="http://schemas.openxmlformats.org/presentationml/2006/main" xmlns:r="http://schemas.openxmlformats.org/officeDocument/2006/relationships">
+<p:notes xmlns:a="http://schemas.openxmlformats.org/drawingml/2006/main" xmlns:r="http://schemas.openxmlformats.org/officeDocument/2006/relationships" xmlns:p="http://schemas.openxmlformats.org/presentationml/2006/main">
   <p:cSld>
     <p:spTree>
       <p:nvGrpSpPr>
@@ -1900,7 +1694,7 @@
         <p:nvSpPr>
           <p:cNvPr id="2" name="Slide Image Placeholder 1"/>
           <p:cNvSpPr>
-            <a:spLocks noGrp="1"/>
+            <a:spLocks noGrp="1" noRot="1" noChangeAspect="1"/>
           </p:cNvSpPr>
           <p:nvPr>
             <p:ph type="sldImg" idx="2"/>
@@ -1915,7 +1709,7 @@
             <a:spLocks noGrp="1"/>
           </p:cNvSpPr>
           <p:nvPr>
-            <p:ph type="body" idx="3" sz="quarter"/>
+            <p:ph type="body" sz="quarter" idx="3"/>
           </p:nvPr>
         </p:nvSpPr>
         <p:spPr/>
@@ -1936,7 +1730,7 @@
             <a:spLocks noGrp="1"/>
           </p:cNvSpPr>
           <p:nvPr>
-            <p:ph type="sldNum" idx="5" sz="quarter"/>
+            <p:ph type="sldNum" sz="quarter" idx="5"/>
           </p:nvPr>
         </p:nvSpPr>
         <p:spPr/>
@@ -1987,10 +1781,9 @@
           <a:lstStyle/>
           <a:p>
             <a:r>
-              <a:rPr lang="en-US" smtClean="0"/>
+              <a:rPr lang="en-US"/>
               <a:t>Click to edit Master title style</a:t>
             </a:r>
-            <a:endParaRPr lang="en-US"/>
           </a:p>
         </p:txBody>
       </p:sp>
@@ -2106,10 +1899,9 @@
           </a:lstStyle>
           <a:p>
             <a:r>
-              <a:rPr lang="en-US" smtClean="0"/>
+              <a:rPr lang="en-US"/>
               <a:t>Click to edit Master subtitle style</a:t>
             </a:r>
-            <a:endParaRPr lang="en-US"/>
           </a:p>
         </p:txBody>
       </p:sp>
@@ -2130,7 +1922,7 @@
           <a:p>
             <a:fld id="{5BCAD085-E8A6-8845-BD4E-CB4CCA059FC4}" type="datetimeFigureOut">
               <a:rPr lang="en-US" smtClean="0"/>
-              <a:t>1/27/13</a:t>
+              <a:t>12/24/25</a:t>
             </a:fld>
             <a:endParaRPr lang="en-US"/>
           </a:p>
@@ -2224,10 +2016,9 @@
           <a:lstStyle/>
           <a:p>
             <a:r>
-              <a:rPr lang="en-US" smtClean="0"/>
+              <a:rPr lang="en-US"/>
               <a:t>Click to edit Master title style</a:t>
             </a:r>
-            <a:endParaRPr lang="en-US"/>
           </a:p>
         </p:txBody>
       </p:sp>
@@ -2248,38 +2039,37 @@
           <a:p>
             <a:pPr lvl="0"/>
             <a:r>
-              <a:rPr lang="en-US" smtClean="0"/>
+              <a:rPr lang="en-US"/>
               <a:t>Click to edit Master text styles</a:t>
             </a:r>
           </a:p>
           <a:p>
             <a:pPr lvl="1"/>
             <a:r>
-              <a:rPr lang="en-US" smtClean="0"/>
+              <a:rPr lang="en-US"/>
               <a:t>Second level</a:t>
             </a:r>
           </a:p>
           <a:p>
             <a:pPr lvl="2"/>
             <a:r>
-              <a:rPr lang="en-US" smtClean="0"/>
+              <a:rPr lang="en-US"/>
               <a:t>Third level</a:t>
             </a:r>
           </a:p>
           <a:p>
             <a:pPr lvl="3"/>
             <a:r>
-              <a:rPr lang="en-US" smtClean="0"/>
+              <a:rPr lang="en-US"/>
               <a:t>Fourth level</a:t>
             </a:r>
           </a:p>
           <a:p>
             <a:pPr lvl="4"/>
             <a:r>
-              <a:rPr lang="en-US" smtClean="0"/>
+              <a:rPr lang="en-US"/>
               <a:t>Fifth level</a:t>
             </a:r>
-            <a:endParaRPr lang="en-US"/>
           </a:p>
         </p:txBody>
       </p:sp>
@@ -2300,7 +2090,7 @@
           <a:p>
             <a:fld id="{5BCAD085-E8A6-8845-BD4E-CB4CCA059FC4}" type="datetimeFigureOut">
               <a:rPr lang="en-US" smtClean="0"/>
-              <a:t>1/27/13</a:t>
+              <a:t>12/24/25</a:t>
             </a:fld>
             <a:endParaRPr lang="en-US"/>
           </a:p>
@@ -2399,10 +2189,9 @@
           <a:lstStyle/>
           <a:p>
             <a:r>
-              <a:rPr lang="en-US" smtClean="0"/>
+              <a:rPr lang="en-US"/>
               <a:t>Click to edit Master title style</a:t>
             </a:r>
-            <a:endParaRPr lang="en-US"/>
           </a:p>
         </p:txBody>
       </p:sp>
@@ -2428,38 +2217,37 @@
           <a:p>
             <a:pPr lvl="0"/>
             <a:r>
-              <a:rPr lang="en-US" smtClean="0"/>
+              <a:rPr lang="en-US"/>
               <a:t>Click to edit Master text styles</a:t>
             </a:r>
           </a:p>
           <a:p>
             <a:pPr lvl="1"/>
             <a:r>
-              <a:rPr lang="en-US" smtClean="0"/>
+              <a:rPr lang="en-US"/>
               <a:t>Second level</a:t>
             </a:r>
           </a:p>
           <a:p>
             <a:pPr lvl="2"/>
             <a:r>
-              <a:rPr lang="en-US" smtClean="0"/>
+              <a:rPr lang="en-US"/>
               <a:t>Third level</a:t>
             </a:r>
           </a:p>
           <a:p>
             <a:pPr lvl="3"/>
             <a:r>
-              <a:rPr lang="en-US" smtClean="0"/>
+              <a:rPr lang="en-US"/>
               <a:t>Fourth level</a:t>
             </a:r>
           </a:p>
           <a:p>
             <a:pPr lvl="4"/>
             <a:r>
-              <a:rPr lang="en-US" smtClean="0"/>
+              <a:rPr lang="en-US"/>
               <a:t>Fifth level</a:t>
             </a:r>
-            <a:endParaRPr lang="en-US"/>
           </a:p>
         </p:txBody>
       </p:sp>
@@ -2480,7 +2268,7 @@
           <a:p>
             <a:fld id="{5BCAD085-E8A6-8845-BD4E-CB4CCA059FC4}" type="datetimeFigureOut">
               <a:rPr lang="en-US" smtClean="0"/>
-              <a:t>1/27/13</a:t>
+              <a:t>12/24/25</a:t>
             </a:fld>
             <a:endParaRPr lang="en-US"/>
           </a:p>
@@ -2574,10 +2362,9 @@
           <a:lstStyle/>
           <a:p>
             <a:r>
-              <a:rPr lang="en-US" smtClean="0"/>
+              <a:rPr lang="en-US"/>
               <a:t>Click to edit Master title style</a:t>
             </a:r>
-            <a:endParaRPr lang="en-US"/>
           </a:p>
         </p:txBody>
       </p:sp>
@@ -2598,38 +2385,37 @@
           <a:p>
             <a:pPr lvl="0"/>
             <a:r>
-              <a:rPr lang="en-US" smtClean="0"/>
+              <a:rPr lang="en-US"/>
               <a:t>Click to edit Master text styles</a:t>
             </a:r>
           </a:p>
           <a:p>
             <a:pPr lvl="1"/>
             <a:r>
-              <a:rPr lang="en-US" smtClean="0"/>
+              <a:rPr lang="en-US"/>
               <a:t>Second level</a:t>
             </a:r>
           </a:p>
           <a:p>
             <a:pPr lvl="2"/>
             <a:r>
-              <a:rPr lang="en-US" smtClean="0"/>
+              <a:rPr lang="en-US"/>
               <a:t>Third level</a:t>
             </a:r>
           </a:p>
           <a:p>
             <a:pPr lvl="3"/>
             <a:r>
-              <a:rPr lang="en-US" smtClean="0"/>
+              <a:rPr lang="en-US"/>
               <a:t>Fourth level</a:t>
             </a:r>
           </a:p>
           <a:p>
             <a:pPr lvl="4"/>
             <a:r>
-              <a:rPr lang="en-US" smtClean="0"/>
+              <a:rPr lang="en-US"/>
               <a:t>Fifth level</a:t>
             </a:r>
-            <a:endParaRPr lang="en-US"/>
           </a:p>
         </p:txBody>
       </p:sp>
@@ -2650,7 +2436,7 @@
           <a:p>
             <a:fld id="{5BCAD085-E8A6-8845-BD4E-CB4CCA059FC4}" type="datetimeFigureOut">
               <a:rPr lang="en-US" smtClean="0"/>
-              <a:t>1/27/13</a:t>
+              <a:t>12/24/25</a:t>
             </a:fld>
             <a:endParaRPr lang="en-US"/>
           </a:p>
@@ -2753,10 +2539,9 @@
           </a:lstStyle>
           <a:p>
             <a:r>
-              <a:rPr lang="en-US" smtClean="0"/>
+              <a:rPr lang="en-US"/>
               <a:t>Click to edit Master title style</a:t>
             </a:r>
-            <a:endParaRPr lang="en-US"/>
           </a:p>
         </p:txBody>
       </p:sp>
@@ -2873,7 +2658,7 @@
           <a:p>
             <a:pPr lvl="0"/>
             <a:r>
-              <a:rPr lang="en-US" smtClean="0"/>
+              <a:rPr lang="en-US"/>
               <a:t>Click to edit Master text styles</a:t>
             </a:r>
           </a:p>
@@ -2896,7 +2681,7 @@
           <a:p>
             <a:fld id="{5BCAD085-E8A6-8845-BD4E-CB4CCA059FC4}" type="datetimeFigureOut">
               <a:rPr lang="en-US" smtClean="0"/>
-              <a:t>1/27/13</a:t>
+              <a:t>12/24/25</a:t>
             </a:fld>
             <a:endParaRPr lang="en-US"/>
           </a:p>
@@ -2990,10 +2775,9 @@
           <a:lstStyle/>
           <a:p>
             <a:r>
-              <a:rPr lang="en-US" smtClean="0"/>
+              <a:rPr lang="en-US"/>
               <a:t>Click to edit Master title style</a:t>
             </a:r>
-            <a:endParaRPr lang="en-US"/>
           </a:p>
         </p:txBody>
       </p:sp>
@@ -3047,38 +2831,37 @@
           <a:p>
             <a:pPr lvl="0"/>
             <a:r>
-              <a:rPr lang="en-US" smtClean="0"/>
+              <a:rPr lang="en-US"/>
               <a:t>Click to edit Master text styles</a:t>
             </a:r>
           </a:p>
           <a:p>
             <a:pPr lvl="1"/>
             <a:r>
-              <a:rPr lang="en-US" smtClean="0"/>
+              <a:rPr lang="en-US"/>
               <a:t>Second level</a:t>
             </a:r>
           </a:p>
           <a:p>
             <a:pPr lvl="2"/>
             <a:r>
-              <a:rPr lang="en-US" smtClean="0"/>
+              <a:rPr lang="en-US"/>
               <a:t>Third level</a:t>
             </a:r>
           </a:p>
           <a:p>
             <a:pPr lvl="3"/>
             <a:r>
-              <a:rPr lang="en-US" smtClean="0"/>
+              <a:rPr lang="en-US"/>
               <a:t>Fourth level</a:t>
             </a:r>
           </a:p>
           <a:p>
             <a:pPr lvl="4"/>
             <a:r>
-              <a:rPr lang="en-US" smtClean="0"/>
+              <a:rPr lang="en-US"/>
               <a:t>Fifth level</a:t>
             </a:r>
-            <a:endParaRPr lang="en-US"/>
           </a:p>
         </p:txBody>
       </p:sp>
@@ -3132,38 +2915,37 @@
           <a:p>
             <a:pPr lvl="0"/>
             <a:r>
-              <a:rPr lang="en-US" smtClean="0"/>
+              <a:rPr lang="en-US"/>
               <a:t>Click to edit Master text styles</a:t>
             </a:r>
           </a:p>
           <a:p>
             <a:pPr lvl="1"/>
             <a:r>
-              <a:rPr lang="en-US" smtClean="0"/>
+              <a:rPr lang="en-US"/>
               <a:t>Second level</a:t>
             </a:r>
           </a:p>
           <a:p>
             <a:pPr lvl="2"/>
             <a:r>
-              <a:rPr lang="en-US" smtClean="0"/>
+              <a:rPr lang="en-US"/>
               <a:t>Third level</a:t>
             </a:r>
           </a:p>
           <a:p>
             <a:pPr lvl="3"/>
             <a:r>
-              <a:rPr lang="en-US" smtClean="0"/>
+              <a:rPr lang="en-US"/>
               <a:t>Fourth level</a:t>
             </a:r>
           </a:p>
           <a:p>
             <a:pPr lvl="4"/>
             <a:r>
-              <a:rPr lang="en-US" smtClean="0"/>
+              <a:rPr lang="en-US"/>
               <a:t>Fifth level</a:t>
             </a:r>
-            <a:endParaRPr lang="en-US"/>
           </a:p>
         </p:txBody>
       </p:sp>
@@ -3184,7 +2966,7 @@
           <a:p>
             <a:fld id="{5BCAD085-E8A6-8845-BD4E-CB4CCA059FC4}" type="datetimeFigureOut">
               <a:rPr lang="en-US" smtClean="0"/>
-              <a:t>1/27/13</a:t>
+              <a:t>12/24/25</a:t>
             </a:fld>
             <a:endParaRPr lang="en-US"/>
           </a:p>
@@ -3282,10 +3064,9 @@
           </a:lstStyle>
           <a:p>
             <a:r>
-              <a:rPr lang="en-US" smtClean="0"/>
+              <a:rPr lang="en-US"/>
               <a:t>Click to edit Master title style</a:t>
             </a:r>
-            <a:endParaRPr lang="en-US"/>
           </a:p>
         </p:txBody>
       </p:sp>
@@ -3348,7 +3129,7 @@
           <a:p>
             <a:pPr lvl="0"/>
             <a:r>
-              <a:rPr lang="en-US" smtClean="0"/>
+              <a:rPr lang="en-US"/>
               <a:t>Click to edit Master text styles</a:t>
             </a:r>
           </a:p>
@@ -3404,38 +3185,37 @@
           <a:p>
             <a:pPr lvl="0"/>
             <a:r>
-              <a:rPr lang="en-US" smtClean="0"/>
+              <a:rPr lang="en-US"/>
               <a:t>Click to edit Master text styles</a:t>
             </a:r>
           </a:p>
           <a:p>
             <a:pPr lvl="1"/>
             <a:r>
-              <a:rPr lang="en-US" smtClean="0"/>
+              <a:rPr lang="en-US"/>
               <a:t>Second level</a:t>
             </a:r>
           </a:p>
           <a:p>
             <a:pPr lvl="2"/>
             <a:r>
-              <a:rPr lang="en-US" smtClean="0"/>
+              <a:rPr lang="en-US"/>
               <a:t>Third level</a:t>
             </a:r>
           </a:p>
           <a:p>
             <a:pPr lvl="3"/>
             <a:r>
-              <a:rPr lang="en-US" smtClean="0"/>
+              <a:rPr lang="en-US"/>
               <a:t>Fourth level</a:t>
             </a:r>
           </a:p>
           <a:p>
             <a:pPr lvl="4"/>
             <a:r>
-              <a:rPr lang="en-US" smtClean="0"/>
+              <a:rPr lang="en-US"/>
               <a:t>Fifth level</a:t>
             </a:r>
-            <a:endParaRPr lang="en-US"/>
           </a:p>
         </p:txBody>
       </p:sp>
@@ -3498,7 +3278,7 @@
           <a:p>
             <a:pPr lvl="0"/>
             <a:r>
-              <a:rPr lang="en-US" smtClean="0"/>
+              <a:rPr lang="en-US"/>
               <a:t>Click to edit Master text styles</a:t>
             </a:r>
           </a:p>
@@ -3554,38 +3334,37 @@
           <a:p>
             <a:pPr lvl="0"/>
             <a:r>
-              <a:rPr lang="en-US" smtClean="0"/>
+              <a:rPr lang="en-US"/>
               <a:t>Click to edit Master text styles</a:t>
             </a:r>
           </a:p>
           <a:p>
             <a:pPr lvl="1"/>
             <a:r>
-              <a:rPr lang="en-US" smtClean="0"/>
+              <a:rPr lang="en-US"/>
               <a:t>Second level</a:t>
             </a:r>
           </a:p>
           <a:p>
             <a:pPr lvl="2"/>
             <a:r>
-              <a:rPr lang="en-US" smtClean="0"/>
+              <a:rPr lang="en-US"/>
               <a:t>Third level</a:t>
             </a:r>
           </a:p>
           <a:p>
             <a:pPr lvl="3"/>
             <a:r>
-              <a:rPr lang="en-US" smtClean="0"/>
+              <a:rPr lang="en-US"/>
               <a:t>Fourth level</a:t>
             </a:r>
           </a:p>
           <a:p>
             <a:pPr lvl="4"/>
             <a:r>
-              <a:rPr lang="en-US" smtClean="0"/>
+              <a:rPr lang="en-US"/>
               <a:t>Fifth level</a:t>
             </a:r>
-            <a:endParaRPr lang="en-US"/>
           </a:p>
         </p:txBody>
       </p:sp>
@@ -3606,7 +3385,7 @@
           <a:p>
             <a:fld id="{5BCAD085-E8A6-8845-BD4E-CB4CCA059FC4}" type="datetimeFigureOut">
               <a:rPr lang="en-US" smtClean="0"/>
-              <a:t>1/27/13</a:t>
+              <a:t>12/24/25</a:t>
             </a:fld>
             <a:endParaRPr lang="en-US"/>
           </a:p>
@@ -3700,10 +3479,9 @@
           <a:lstStyle/>
           <a:p>
             <a:r>
-              <a:rPr lang="en-US" smtClean="0"/>
+              <a:rPr lang="en-US"/>
               <a:t>Click to edit Master title style</a:t>
             </a:r>
-            <a:endParaRPr lang="en-US"/>
           </a:p>
         </p:txBody>
       </p:sp>
@@ -3724,7 +3502,7 @@
           <a:p>
             <a:fld id="{5BCAD085-E8A6-8845-BD4E-CB4CCA059FC4}" type="datetimeFigureOut">
               <a:rPr lang="en-US" smtClean="0"/>
-              <a:t>1/27/13</a:t>
+              <a:t>12/24/25</a:t>
             </a:fld>
             <a:endParaRPr lang="en-US"/>
           </a:p>
@@ -3819,7 +3597,7 @@
           <a:p>
             <a:fld id="{5BCAD085-E8A6-8845-BD4E-CB4CCA059FC4}" type="datetimeFigureOut">
               <a:rPr lang="en-US" smtClean="0"/>
-              <a:t>1/27/13</a:t>
+              <a:t>12/24/25</a:t>
             </a:fld>
             <a:endParaRPr lang="en-US"/>
           </a:p>
@@ -3922,10 +3700,9 @@
           </a:lstStyle>
           <a:p>
             <a:r>
-              <a:rPr lang="en-US" smtClean="0"/>
+              <a:rPr lang="en-US"/>
               <a:t>Click to edit Master title style</a:t>
             </a:r>
-            <a:endParaRPr lang="en-US"/>
           </a:p>
         </p:txBody>
       </p:sp>
@@ -3979,38 +3756,37 @@
           <a:p>
             <a:pPr lvl="0"/>
             <a:r>
-              <a:rPr lang="en-US" smtClean="0"/>
+              <a:rPr lang="en-US"/>
               <a:t>Click to edit Master text styles</a:t>
             </a:r>
           </a:p>
           <a:p>
             <a:pPr lvl="1"/>
             <a:r>
-              <a:rPr lang="en-US" smtClean="0"/>
+              <a:rPr lang="en-US"/>
               <a:t>Second level</a:t>
             </a:r>
           </a:p>
           <a:p>
             <a:pPr lvl="2"/>
             <a:r>
-              <a:rPr lang="en-US" smtClean="0"/>
+              <a:rPr lang="en-US"/>
               <a:t>Third level</a:t>
             </a:r>
           </a:p>
           <a:p>
             <a:pPr lvl="3"/>
             <a:r>
-              <a:rPr lang="en-US" smtClean="0"/>
+              <a:rPr lang="en-US"/>
               <a:t>Fourth level</a:t>
             </a:r>
           </a:p>
           <a:p>
             <a:pPr lvl="4"/>
             <a:r>
-              <a:rPr lang="en-US" smtClean="0"/>
+              <a:rPr lang="en-US"/>
               <a:t>Fifth level</a:t>
             </a:r>
-            <a:endParaRPr lang="en-US"/>
           </a:p>
         </p:txBody>
       </p:sp>
@@ -4073,7 +3849,7 @@
           <a:p>
             <a:pPr lvl="0"/>
             <a:r>
-              <a:rPr lang="en-US" smtClean="0"/>
+              <a:rPr lang="en-US"/>
               <a:t>Click to edit Master text styles</a:t>
             </a:r>
           </a:p>
@@ -4096,7 +3872,7 @@
           <a:p>
             <a:fld id="{5BCAD085-E8A6-8845-BD4E-CB4CCA059FC4}" type="datetimeFigureOut">
               <a:rPr lang="en-US" smtClean="0"/>
-              <a:t>1/27/13</a:t>
+              <a:t>12/24/25</a:t>
             </a:fld>
             <a:endParaRPr lang="en-US"/>
           </a:p>
@@ -4199,10 +3975,9 @@
           </a:lstStyle>
           <a:p>
             <a:r>
-              <a:rPr lang="en-US" smtClean="0"/>
+              <a:rPr lang="en-US"/>
               <a:t>Click to edit Master title style</a:t>
             </a:r>
-            <a:endParaRPr lang="en-US"/>
           </a:p>
         </p:txBody>
       </p:sp>
@@ -4326,7 +4101,7 @@
           <a:p>
             <a:pPr lvl="0"/>
             <a:r>
-              <a:rPr lang="en-US" smtClean="0"/>
+              <a:rPr lang="en-US"/>
               <a:t>Click to edit Master text styles</a:t>
             </a:r>
           </a:p>
@@ -4349,7 +4124,7 @@
           <a:p>
             <a:fld id="{5BCAD085-E8A6-8845-BD4E-CB4CCA059FC4}" type="datetimeFigureOut">
               <a:rPr lang="en-US" smtClean="0"/>
-              <a:t>1/27/13</a:t>
+              <a:t>12/24/25</a:t>
             </a:fld>
             <a:endParaRPr lang="en-US"/>
           </a:p>
@@ -4458,10 +4233,9 @@
           <a:lstStyle/>
           <a:p>
             <a:r>
-              <a:rPr lang="en-US" smtClean="0"/>
+              <a:rPr lang="en-US"/>
               <a:t>Click to edit Master title style</a:t>
             </a:r>
-            <a:endParaRPr lang="en-US"/>
           </a:p>
         </p:txBody>
       </p:sp>
@@ -4492,38 +4266,37 @@
           <a:p>
             <a:pPr lvl="0"/>
             <a:r>
-              <a:rPr lang="en-US" smtClean="0"/>
+              <a:rPr lang="en-US"/>
               <a:t>Click to edit Master text styles</a:t>
             </a:r>
           </a:p>
           <a:p>
             <a:pPr lvl="1"/>
             <a:r>
-              <a:rPr lang="en-US" smtClean="0"/>
+              <a:rPr lang="en-US"/>
               <a:t>Second level</a:t>
             </a:r>
           </a:p>
           <a:p>
             <a:pPr lvl="2"/>
             <a:r>
-              <a:rPr lang="en-US" smtClean="0"/>
+              <a:rPr lang="en-US"/>
               <a:t>Third level</a:t>
             </a:r>
           </a:p>
           <a:p>
             <a:pPr lvl="3"/>
             <a:r>
-              <a:rPr lang="en-US" smtClean="0"/>
+              <a:rPr lang="en-US"/>
               <a:t>Fourth level</a:t>
             </a:r>
           </a:p>
           <a:p>
             <a:pPr lvl="4"/>
             <a:r>
-              <a:rPr lang="en-US" smtClean="0"/>
+              <a:rPr lang="en-US"/>
               <a:t>Fifth level</a:t>
             </a:r>
-            <a:endParaRPr lang="en-US"/>
           </a:p>
         </p:txBody>
       </p:sp>
@@ -4562,7 +4335,7 @@
           <a:p>
             <a:fld id="{5BCAD085-E8A6-8845-BD4E-CB4CCA059FC4}" type="datetimeFigureOut">
               <a:rPr lang="en-US" smtClean="0"/>
-              <a:t>1/27/13</a:t>
+              <a:t>12/24/25</a:t>
             </a:fld>
             <a:endParaRPr lang="en-US"/>
           </a:p>
@@ -4921,7 +4694,7 @@
 </file>
 
 <file path=ppt/slides/slide1.xml><?xml version="1.0" encoding="utf-8"?>
-<p:sld xmlns:a="http://schemas.openxmlformats.org/drawingml/2006/main" xmlns:p="http://schemas.openxmlformats.org/presentationml/2006/main" xmlns:r="http://schemas.openxmlformats.org/officeDocument/2006/relationships">
+<p:sld xmlns:a="http://schemas.openxmlformats.org/drawingml/2006/main" xmlns:r="http://schemas.openxmlformats.org/officeDocument/2006/relationships" xmlns:p="http://schemas.openxmlformats.org/presentationml/2006/main">
   <p:cSld>
     <p:spTree>
       <p:nvGrpSpPr>
@@ -4929,7 +4702,14 @@
         <p:cNvGrpSpPr/>
         <p:nvPr/>
       </p:nvGrpSpPr>
-      <p:grpSpPr/>
+      <p:grpSpPr>
+        <a:xfrm>
+          <a:off x="0" y="0"/>
+          <a:ext cx="0" cy="0"/>
+          <a:chOff x="0" y="0"/>
+          <a:chExt cx="0" cy="0"/>
+        </a:xfrm>
+      </p:grpSpPr>
       <p:sp>
         <p:nvSpPr>
           <p:cNvPr id="2" name="Title 1"/>
@@ -4991,7 +4771,7 @@
 </file>
 
 <file path=ppt/slides/slide10.xml><?xml version="1.0" encoding="utf-8"?>
-<p:sld xmlns:a="http://schemas.openxmlformats.org/drawingml/2006/main" xmlns:p="http://schemas.openxmlformats.org/presentationml/2006/main" xmlns:r="http://schemas.openxmlformats.org/officeDocument/2006/relationships">
+<p:sld xmlns:a="http://schemas.openxmlformats.org/drawingml/2006/main" xmlns:r="http://schemas.openxmlformats.org/officeDocument/2006/relationships" xmlns:p="http://schemas.openxmlformats.org/presentationml/2006/main">
   <p:cSld>
     <p:spTree>
       <p:nvGrpSpPr>
@@ -4999,7 +4779,14 @@
         <p:cNvGrpSpPr/>
         <p:nvPr/>
       </p:nvGrpSpPr>
-      <p:grpSpPr/>
+      <p:grpSpPr>
+        <a:xfrm>
+          <a:off x="0" y="0"/>
+          <a:ext cx="0" cy="0"/>
+          <a:chOff x="0" y="0"/>
+          <a:chExt cx="0" cy="0"/>
+        </a:xfrm>
+      </p:grpSpPr>
       <p:sp>
         <p:nvSpPr>
           <p:cNvPr id="2" name="Title 1"/>
@@ -5055,7 +4842,9 @@
               <a:t>Not a low-code platform</a:t>
             </a:r>
           </a:p>
-          <a:p/>
+          <a:p>
+            <a:endParaRPr/>
+          </a:p>
           <a:p>
             <a:r>
               <a:t>UbeCode is a governing platform.</a:t>
@@ -5072,7 +4861,7 @@
 </file>
 
 <file path=ppt/slides/slide11.xml><?xml version="1.0" encoding="utf-8"?>
-<p:sld xmlns:a="http://schemas.openxmlformats.org/drawingml/2006/main" xmlns:p="http://schemas.openxmlformats.org/presentationml/2006/main" xmlns:r="http://schemas.openxmlformats.org/officeDocument/2006/relationships">
+<p:sld xmlns:a="http://schemas.openxmlformats.org/drawingml/2006/main" xmlns:r="http://schemas.openxmlformats.org/officeDocument/2006/relationships" xmlns:p="http://schemas.openxmlformats.org/presentationml/2006/main">
   <p:cSld>
     <p:spTree>
       <p:nvGrpSpPr>
@@ -5080,7 +4869,14 @@
         <p:cNvGrpSpPr/>
         <p:nvPr/>
       </p:nvGrpSpPr>
-      <p:grpSpPr/>
+      <p:grpSpPr>
+        <a:xfrm>
+          <a:off x="0" y="0"/>
+          <a:ext cx="0" cy="0"/>
+          <a:chOff x="0" y="0"/>
+          <a:chExt cx="0" cy="0"/>
+        </a:xfrm>
+      </p:grpSpPr>
       <p:sp>
         <p:nvSpPr>
           <p:cNvPr id="2" name="Title 1"/>
@@ -5147,7 +4943,7 @@
 </file>
 
 <file path=ppt/slides/slide12.xml><?xml version="1.0" encoding="utf-8"?>
-<p:sld xmlns:a="http://schemas.openxmlformats.org/drawingml/2006/main" xmlns:p="http://schemas.openxmlformats.org/presentationml/2006/main" xmlns:r="http://schemas.openxmlformats.org/officeDocument/2006/relationships">
+<p:sld xmlns:a="http://schemas.openxmlformats.org/drawingml/2006/main" xmlns:r="http://schemas.openxmlformats.org/officeDocument/2006/relationships" xmlns:p="http://schemas.openxmlformats.org/presentationml/2006/main">
   <p:cSld>
     <p:spTree>
       <p:nvGrpSpPr>
@@ -5155,7 +4951,14 @@
         <p:cNvGrpSpPr/>
         <p:nvPr/>
       </p:nvGrpSpPr>
-      <p:grpSpPr/>
+      <p:grpSpPr>
+        <a:xfrm>
+          <a:off x="0" y="0"/>
+          <a:ext cx="0" cy="0"/>
+          <a:chOff x="0" y="0"/>
+          <a:chExt cx="0" cy="0"/>
+        </a:xfrm>
+      </p:grpSpPr>
       <p:sp>
         <p:nvSpPr>
           <p:cNvPr id="2" name="Title 1"/>
@@ -5217,7 +5020,7 @@
 </file>
 
 <file path=ppt/slides/slide13.xml><?xml version="1.0" encoding="utf-8"?>
-<p:sld xmlns:a="http://schemas.openxmlformats.org/drawingml/2006/main" xmlns:p="http://schemas.openxmlformats.org/presentationml/2006/main" xmlns:r="http://schemas.openxmlformats.org/officeDocument/2006/relationships">
+<p:sld xmlns:a="http://schemas.openxmlformats.org/drawingml/2006/main" xmlns:r="http://schemas.openxmlformats.org/officeDocument/2006/relationships" xmlns:p="http://schemas.openxmlformats.org/presentationml/2006/main">
   <p:cSld>
     <p:spTree>
       <p:nvGrpSpPr>
@@ -5225,7 +5028,14 @@
         <p:cNvGrpSpPr/>
         <p:nvPr/>
       </p:nvGrpSpPr>
-      <p:grpSpPr/>
+      <p:grpSpPr>
+        <a:xfrm>
+          <a:off x="0" y="0"/>
+          <a:ext cx="0" cy="0"/>
+          <a:chOff x="0" y="0"/>
+          <a:chExt cx="0" cy="0"/>
+        </a:xfrm>
+      </p:grpSpPr>
       <p:sp>
         <p:nvSpPr>
           <p:cNvPr id="2" name="Title 1"/>
@@ -5276,7 +5086,9 @@
               <a:t>AI accelerates execution.</a:t>
             </a:r>
           </a:p>
-          <a:p/>
+          <a:p>
+            <a:endParaRPr/>
+          </a:p>
           <a:p>
             <a:r>
               <a:t>INTENT governs what must remain true.</a:t>
@@ -5293,7 +5105,7 @@
 </file>
 
 <file path=ppt/slides/slide14.xml><?xml version="1.0" encoding="utf-8"?>
-<p:sld xmlns:a="http://schemas.openxmlformats.org/drawingml/2006/main" xmlns:p="http://schemas.openxmlformats.org/presentationml/2006/main" xmlns:r="http://schemas.openxmlformats.org/officeDocument/2006/relationships">
+<p:sld xmlns:a="http://schemas.openxmlformats.org/drawingml/2006/main" xmlns:r="http://schemas.openxmlformats.org/officeDocument/2006/relationships" xmlns:p="http://schemas.openxmlformats.org/presentationml/2006/main">
   <p:cSld>
     <p:spTree>
       <p:nvGrpSpPr>
@@ -5301,7 +5113,14 @@
         <p:cNvGrpSpPr/>
         <p:nvPr/>
       </p:nvGrpSpPr>
-      <p:grpSpPr/>
+      <p:grpSpPr>
+        <a:xfrm>
+          <a:off x="0" y="0"/>
+          <a:ext cx="0" cy="0"/>
+          <a:chOff x="0" y="0"/>
+          <a:chExt cx="0" cy="0"/>
+        </a:xfrm>
+      </p:grpSpPr>
       <p:sp>
         <p:nvSpPr>
           <p:cNvPr id="2" name="Title 1"/>
@@ -5358,7 +5177,7 @@
 </file>
 
 <file path=ppt/slides/slide15.xml><?xml version="1.0" encoding="utf-8"?>
-<p:sld xmlns:a="http://schemas.openxmlformats.org/drawingml/2006/main" xmlns:p="http://schemas.openxmlformats.org/presentationml/2006/main" xmlns:r="http://schemas.openxmlformats.org/officeDocument/2006/relationships">
+<p:sld xmlns:a="http://schemas.openxmlformats.org/drawingml/2006/main" xmlns:r="http://schemas.openxmlformats.org/officeDocument/2006/relationships" xmlns:p="http://schemas.openxmlformats.org/presentationml/2006/main">
   <p:cSld>
     <p:spTree>
       <p:nvGrpSpPr>
@@ -5366,7 +5185,14 @@
         <p:cNvGrpSpPr/>
         <p:nvPr/>
       </p:nvGrpSpPr>
-      <p:grpSpPr/>
+      <p:grpSpPr>
+        <a:xfrm>
+          <a:off x="0" y="0"/>
+          <a:ext cx="0" cy="0"/>
+          <a:chOff x="0" y="0"/>
+          <a:chExt cx="0" cy="0"/>
+        </a:xfrm>
+      </p:grpSpPr>
       <p:sp>
         <p:nvSpPr>
           <p:cNvPr id="2" name="Title 1"/>
@@ -5412,7 +5238,9 @@
               <a:t>Scale with confidence.</a:t>
             </a:r>
           </a:p>
-          <a:p/>
+          <a:p>
+            <a:endParaRPr/>
+          </a:p>
           <a:p>
             <a:r>
               <a:t>INTENT preserves meaning.</a:t>
@@ -5434,7 +5262,7 @@
 </file>
 
 <file path=ppt/slides/slide16.xml><?xml version="1.0" encoding="utf-8"?>
-<p:sld xmlns:a="http://schemas.openxmlformats.org/drawingml/2006/main" xmlns:p="http://schemas.openxmlformats.org/presentationml/2006/main" xmlns:r="http://schemas.openxmlformats.org/officeDocument/2006/relationships">
+<p:sld xmlns:a="http://schemas.openxmlformats.org/drawingml/2006/main" xmlns:r="http://schemas.openxmlformats.org/officeDocument/2006/relationships" xmlns:p="http://schemas.openxmlformats.org/presentationml/2006/main">
   <p:cSld>
     <p:spTree>
       <p:nvGrpSpPr>
@@ -5442,7 +5270,14 @@
         <p:cNvGrpSpPr/>
         <p:nvPr/>
       </p:nvGrpSpPr>
-      <p:grpSpPr/>
+      <p:grpSpPr>
+        <a:xfrm>
+          <a:off x="0" y="0"/>
+          <a:ext cx="0" cy="0"/>
+          <a:chOff x="0" y="0"/>
+          <a:chExt cx="0" cy="0"/>
+        </a:xfrm>
+      </p:grpSpPr>
       <p:sp>
         <p:nvSpPr>
           <p:cNvPr id="2" name="Title 1"/>
@@ -5499,7 +5334,7 @@
 </file>
 
 <file path=ppt/slides/slide17.xml><?xml version="1.0" encoding="utf-8"?>
-<p:sld xmlns:a="http://schemas.openxmlformats.org/drawingml/2006/main" xmlns:p="http://schemas.openxmlformats.org/presentationml/2006/main" xmlns:r="http://schemas.openxmlformats.org/officeDocument/2006/relationships">
+<p:sld xmlns:a="http://schemas.openxmlformats.org/drawingml/2006/main" xmlns:r="http://schemas.openxmlformats.org/officeDocument/2006/relationships" xmlns:p="http://schemas.openxmlformats.org/presentationml/2006/main">
   <p:cSld>
     <p:spTree>
       <p:nvGrpSpPr>
@@ -5507,7 +5342,14 @@
         <p:cNvGrpSpPr/>
         <p:nvPr/>
       </p:nvGrpSpPr>
-      <p:grpSpPr/>
+      <p:grpSpPr>
+        <a:xfrm>
+          <a:off x="0" y="0"/>
+          <a:ext cx="0" cy="0"/>
+          <a:chOff x="0" y="0"/>
+          <a:chExt cx="0" cy="0"/>
+        </a:xfrm>
+      </p:grpSpPr>
       <p:sp>
         <p:nvSpPr>
           <p:cNvPr id="2" name="Title 1"/>
@@ -5559,7 +5401,7 @@
 </file>
 
 <file path=ppt/slides/slide18.xml><?xml version="1.0" encoding="utf-8"?>
-<p:sld xmlns:a="http://schemas.openxmlformats.org/drawingml/2006/main" xmlns:p="http://schemas.openxmlformats.org/presentationml/2006/main" xmlns:r="http://schemas.openxmlformats.org/officeDocument/2006/relationships">
+<p:sld xmlns:a="http://schemas.openxmlformats.org/drawingml/2006/main" xmlns:r="http://schemas.openxmlformats.org/officeDocument/2006/relationships" xmlns:p="http://schemas.openxmlformats.org/presentationml/2006/main">
   <p:cSld>
     <p:spTree>
       <p:nvGrpSpPr>
@@ -5567,7 +5409,14 @@
         <p:cNvGrpSpPr/>
         <p:nvPr/>
       </p:nvGrpSpPr>
-      <p:grpSpPr/>
+      <p:grpSpPr>
+        <a:xfrm>
+          <a:off x="0" y="0"/>
+          <a:ext cx="0" cy="0"/>
+          <a:chOff x="0" y="0"/>
+          <a:chExt cx="0" cy="0"/>
+        </a:xfrm>
+      </p:grpSpPr>
       <p:sp>
         <p:nvSpPr>
           <p:cNvPr id="2" name="Title 1"/>
@@ -5624,7 +5473,7 @@
 </file>
 
 <file path=ppt/slides/slide19.xml><?xml version="1.0" encoding="utf-8"?>
-<p:sld xmlns:a="http://schemas.openxmlformats.org/drawingml/2006/main" xmlns:p="http://schemas.openxmlformats.org/presentationml/2006/main" xmlns:r="http://schemas.openxmlformats.org/officeDocument/2006/relationships">
+<p:sld xmlns:a="http://schemas.openxmlformats.org/drawingml/2006/main" xmlns:r="http://schemas.openxmlformats.org/officeDocument/2006/relationships" xmlns:p="http://schemas.openxmlformats.org/presentationml/2006/main">
   <p:cSld>
     <p:spTree>
       <p:nvGrpSpPr>
@@ -5632,7 +5481,14 @@
         <p:cNvGrpSpPr/>
         <p:nvPr/>
       </p:nvGrpSpPr>
-      <p:grpSpPr/>
+      <p:grpSpPr>
+        <a:xfrm>
+          <a:off x="0" y="0"/>
+          <a:ext cx="0" cy="0"/>
+          <a:chOff x="0" y="0"/>
+          <a:chExt cx="0" cy="0"/>
+        </a:xfrm>
+      </p:grpSpPr>
       <p:sp>
         <p:nvSpPr>
           <p:cNvPr id="2" name="Title 1"/>
@@ -5689,7 +5545,7 @@
 </file>
 
 <file path=ppt/slides/slide2.xml><?xml version="1.0" encoding="utf-8"?>
-<p:sld xmlns:a="http://schemas.openxmlformats.org/drawingml/2006/main" xmlns:p="http://schemas.openxmlformats.org/presentationml/2006/main" xmlns:r="http://schemas.openxmlformats.org/officeDocument/2006/relationships">
+<p:sld xmlns:a="http://schemas.openxmlformats.org/drawingml/2006/main" xmlns:r="http://schemas.openxmlformats.org/officeDocument/2006/relationships" xmlns:p="http://schemas.openxmlformats.org/presentationml/2006/main">
   <p:cSld>
     <p:spTree>
       <p:nvGrpSpPr>
@@ -5697,7 +5553,14 @@
         <p:cNvGrpSpPr/>
         <p:nvPr/>
       </p:nvGrpSpPr>
-      <p:grpSpPr/>
+      <p:grpSpPr>
+        <a:xfrm>
+          <a:off x="0" y="0"/>
+          <a:ext cx="0" cy="0"/>
+          <a:chOff x="0" y="0"/>
+          <a:chExt cx="0" cy="0"/>
+        </a:xfrm>
+      </p:grpSpPr>
       <p:sp>
         <p:nvSpPr>
           <p:cNvPr id="2" name="Title 1"/>
@@ -5743,7 +5606,9 @@
               <a:t>Execution is no longer scarce.</a:t>
             </a:r>
           </a:p>
-          <a:p/>
+          <a:p>
+            <a:endParaRPr/>
+          </a:p>
           <a:p>
             <a:r>
               <a:t>Decision quality and intent clarity are now the bottleneck.</a:t>
@@ -5760,7 +5625,7 @@
 </file>
 
 <file path=ppt/slides/slide20.xml><?xml version="1.0" encoding="utf-8"?>
-<p:sld xmlns:a="http://schemas.openxmlformats.org/drawingml/2006/main" xmlns:p="http://schemas.openxmlformats.org/presentationml/2006/main" xmlns:r="http://schemas.openxmlformats.org/officeDocument/2006/relationships">
+<p:sld xmlns:a="http://schemas.openxmlformats.org/drawingml/2006/main" xmlns:r="http://schemas.openxmlformats.org/officeDocument/2006/relationships" xmlns:p="http://schemas.openxmlformats.org/presentationml/2006/main">
   <p:cSld>
     <p:spTree>
       <p:nvGrpSpPr>
@@ -5768,7 +5633,14 @@
         <p:cNvGrpSpPr/>
         <p:nvPr/>
       </p:nvGrpSpPr>
-      <p:grpSpPr/>
+      <p:grpSpPr>
+        <a:xfrm>
+          <a:off x="0" y="0"/>
+          <a:ext cx="0" cy="0"/>
+          <a:chOff x="0" y="0"/>
+          <a:chExt cx="0" cy="0"/>
+        </a:xfrm>
+      </p:grpSpPr>
       <p:sp>
         <p:nvSpPr>
           <p:cNvPr id="2" name="Title 1"/>
@@ -5825,7 +5697,7 @@
 </file>
 
 <file path=ppt/slides/slide21.xml><?xml version="1.0" encoding="utf-8"?>
-<p:sld xmlns:a="http://schemas.openxmlformats.org/drawingml/2006/main" xmlns:p="http://schemas.openxmlformats.org/presentationml/2006/main" xmlns:r="http://schemas.openxmlformats.org/officeDocument/2006/relationships">
+<p:sld xmlns:a="http://schemas.openxmlformats.org/drawingml/2006/main" xmlns:r="http://schemas.openxmlformats.org/officeDocument/2006/relationships" xmlns:p="http://schemas.openxmlformats.org/presentationml/2006/main">
   <p:cSld>
     <p:spTree>
       <p:nvGrpSpPr>
@@ -5833,7 +5705,14 @@
         <p:cNvGrpSpPr/>
         <p:nvPr/>
       </p:nvGrpSpPr>
-      <p:grpSpPr/>
+      <p:grpSpPr>
+        <a:xfrm>
+          <a:off x="0" y="0"/>
+          <a:ext cx="0" cy="0"/>
+          <a:chOff x="0" y="0"/>
+          <a:chExt cx="0" cy="0"/>
+        </a:xfrm>
+      </p:grpSpPr>
       <p:sp>
         <p:nvSpPr>
           <p:cNvPr id="2" name="Title 1"/>
@@ -5885,7 +5764,7 @@
 </file>
 
 <file path=ppt/slides/slide22.xml><?xml version="1.0" encoding="utf-8"?>
-<p:sld xmlns:a="http://schemas.openxmlformats.org/drawingml/2006/main" xmlns:p="http://schemas.openxmlformats.org/presentationml/2006/main" xmlns:r="http://schemas.openxmlformats.org/officeDocument/2006/relationships">
+<p:sld xmlns:a="http://schemas.openxmlformats.org/drawingml/2006/main" xmlns:r="http://schemas.openxmlformats.org/officeDocument/2006/relationships" xmlns:p="http://schemas.openxmlformats.org/presentationml/2006/main">
   <p:cSld>
     <p:spTree>
       <p:nvGrpSpPr>
@@ -5893,7 +5772,14 @@
         <p:cNvGrpSpPr/>
         <p:nvPr/>
       </p:nvGrpSpPr>
-      <p:grpSpPr/>
+      <p:grpSpPr>
+        <a:xfrm>
+          <a:off x="0" y="0"/>
+          <a:ext cx="0" cy="0"/>
+          <a:chOff x="0" y="0"/>
+          <a:chExt cx="0" cy="0"/>
+        </a:xfrm>
+      </p:grpSpPr>
       <p:sp>
         <p:nvSpPr>
           <p:cNvPr id="2" name="Title 1"/>
@@ -6144,7 +6030,7 @@
 </file>
 
 <file path=ppt/slides/slide23.xml><?xml version="1.0" encoding="utf-8"?>
-<p:sld xmlns:a="http://schemas.openxmlformats.org/drawingml/2006/main" xmlns:p="http://schemas.openxmlformats.org/presentationml/2006/main" xmlns:r="http://schemas.openxmlformats.org/officeDocument/2006/relationships">
+<p:sld xmlns:a="http://schemas.openxmlformats.org/drawingml/2006/main" xmlns:r="http://schemas.openxmlformats.org/officeDocument/2006/relationships" xmlns:p="http://schemas.openxmlformats.org/presentationml/2006/main">
   <p:cSld>
     <p:spTree>
       <p:nvGrpSpPr>
@@ -6152,7 +6038,14 @@
         <p:cNvGrpSpPr/>
         <p:nvPr/>
       </p:nvGrpSpPr>
-      <p:grpSpPr/>
+      <p:grpSpPr>
+        <a:xfrm>
+          <a:off x="0" y="0"/>
+          <a:ext cx="0" cy="0"/>
+          <a:chOff x="0" y="0"/>
+          <a:chExt cx="0" cy="0"/>
+        </a:xfrm>
+      </p:grpSpPr>
       <p:sp>
         <p:nvSpPr>
           <p:cNvPr id="2" name="Title 1"/>
@@ -6211,7 +6104,9 @@
               <a:t>INTENT (Governing Layer)</a:t>
             </a:r>
           </a:p>
-          <a:p/>
+          <a:p>
+            <a:endParaRPr/>
+          </a:p>
           <a:p>
             <a:r>
               <a:t>• Intent &amp; Specification Authority</a:t>
@@ -6227,7 +6122,9 @@
               <a:t>• Continuous Validation</a:t>
             </a:r>
           </a:p>
-          <a:p/>
+          <a:p>
+            <a:endParaRPr/>
+          </a:p>
           <a:p>
             <a:r>
               <a:t>Operating Above:</a:t>
@@ -6249,7 +6146,7 @@
 </file>
 
 <file path=ppt/slides/slide3.xml><?xml version="1.0" encoding="utf-8"?>
-<p:sld xmlns:a="http://schemas.openxmlformats.org/drawingml/2006/main" xmlns:p="http://schemas.openxmlformats.org/presentationml/2006/main" xmlns:r="http://schemas.openxmlformats.org/officeDocument/2006/relationships">
+<p:sld xmlns:a="http://schemas.openxmlformats.org/drawingml/2006/main" xmlns:r="http://schemas.openxmlformats.org/officeDocument/2006/relationships" xmlns:p="http://schemas.openxmlformats.org/presentationml/2006/main">
   <p:cSld>
     <p:spTree>
       <p:nvGrpSpPr>
@@ -6257,7 +6154,14 @@
         <p:cNvGrpSpPr/>
         <p:nvPr/>
       </p:nvGrpSpPr>
-      <p:grpSpPr/>
+      <p:grpSpPr>
+        <a:xfrm>
+          <a:off x="0" y="0"/>
+          <a:ext cx="0" cy="0"/>
+          <a:chOff x="0" y="0"/>
+          <a:chExt cx="0" cy="0"/>
+        </a:xfrm>
+      </p:grpSpPr>
       <p:sp>
         <p:nvSpPr>
           <p:cNvPr id="2" name="Title 1"/>
@@ -6319,7 +6223,7 @@
 </file>
 
 <file path=ppt/slides/slide4.xml><?xml version="1.0" encoding="utf-8"?>
-<p:sld xmlns:a="http://schemas.openxmlformats.org/drawingml/2006/main" xmlns:p="http://schemas.openxmlformats.org/presentationml/2006/main" xmlns:r="http://schemas.openxmlformats.org/officeDocument/2006/relationships">
+<p:sld xmlns:a="http://schemas.openxmlformats.org/drawingml/2006/main" xmlns:r="http://schemas.openxmlformats.org/officeDocument/2006/relationships" xmlns:p="http://schemas.openxmlformats.org/presentationml/2006/main">
   <p:cSld>
     <p:spTree>
       <p:nvGrpSpPr>
@@ -6327,7 +6231,14 @@
         <p:cNvGrpSpPr/>
         <p:nvPr/>
       </p:nvGrpSpPr>
-      <p:grpSpPr/>
+      <p:grpSpPr>
+        <a:xfrm>
+          <a:off x="0" y="0"/>
+          <a:ext cx="0" cy="0"/>
+          <a:chOff x="0" y="0"/>
+          <a:chExt cx="0" cy="0"/>
+        </a:xfrm>
+      </p:grpSpPr>
       <p:sp>
         <p:nvSpPr>
           <p:cNvPr id="2" name="Title 1"/>
@@ -6378,7 +6289,9 @@
               <a:t>AI tools optimize output generation.</a:t>
             </a:r>
           </a:p>
-          <a:p/>
+          <a:p>
+            <a:endParaRPr/>
+          </a:p>
           <a:p>
             <a:r>
               <a:t>None govern intent preservation.</a:t>
@@ -6395,7 +6308,7 @@
 </file>
 
 <file path=ppt/slides/slide5.xml><?xml version="1.0" encoding="utf-8"?>
-<p:sld xmlns:a="http://schemas.openxmlformats.org/drawingml/2006/main" xmlns:p="http://schemas.openxmlformats.org/presentationml/2006/main" xmlns:r="http://schemas.openxmlformats.org/officeDocument/2006/relationships">
+<p:sld xmlns:a="http://schemas.openxmlformats.org/drawingml/2006/main" xmlns:r="http://schemas.openxmlformats.org/officeDocument/2006/relationships" xmlns:p="http://schemas.openxmlformats.org/presentationml/2006/main">
   <p:cSld>
     <p:spTree>
       <p:nvGrpSpPr>
@@ -6403,7 +6316,14 @@
         <p:cNvGrpSpPr/>
         <p:nvPr/>
       </p:nvGrpSpPr>
-      <p:grpSpPr/>
+      <p:grpSpPr>
+        <a:xfrm>
+          <a:off x="0" y="0"/>
+          <a:ext cx="0" cy="0"/>
+          <a:chOff x="0" y="0"/>
+          <a:chExt cx="0" cy="0"/>
+        </a:xfrm>
+      </p:grpSpPr>
       <p:sp>
         <p:nvSpPr>
           <p:cNvPr id="2" name="Title 1"/>
@@ -6470,7 +6390,7 @@
 </file>
 
 <file path=ppt/slides/slide6.xml><?xml version="1.0" encoding="utf-8"?>
-<p:sld xmlns:a="http://schemas.openxmlformats.org/drawingml/2006/main" xmlns:p="http://schemas.openxmlformats.org/presentationml/2006/main" xmlns:r="http://schemas.openxmlformats.org/officeDocument/2006/relationships">
+<p:sld xmlns:a="http://schemas.openxmlformats.org/drawingml/2006/main" xmlns:r="http://schemas.openxmlformats.org/officeDocument/2006/relationships" xmlns:p="http://schemas.openxmlformats.org/presentationml/2006/main">
   <p:cSld>
     <p:spTree>
       <p:nvGrpSpPr>
@@ -6478,7 +6398,14 @@
         <p:cNvGrpSpPr/>
         <p:nvPr/>
       </p:nvGrpSpPr>
-      <p:grpSpPr/>
+      <p:grpSpPr>
+        <a:xfrm>
+          <a:off x="0" y="0"/>
+          <a:ext cx="0" cy="0"/>
+          <a:chOff x="0" y="0"/>
+          <a:chExt cx="0" cy="0"/>
+        </a:xfrm>
+      </p:grpSpPr>
       <p:sp>
         <p:nvSpPr>
           <p:cNvPr id="2" name="Title 1"/>
@@ -6519,7 +6446,9 @@
               <a:t>Intent-Centered, Engineering-Driven Notation for Transformation</a:t>
             </a:r>
           </a:p>
-          <a:p/>
+          <a:p>
+            <a:endParaRPr/>
+          </a:p>
           <a:p>
             <a:r>
               <a:t>Human intent is the highest-value input.</a:t>
@@ -6546,7 +6475,7 @@
 </file>
 
 <file path=ppt/slides/slide7.xml><?xml version="1.0" encoding="utf-8"?>
-<p:sld xmlns:a="http://schemas.openxmlformats.org/drawingml/2006/main" xmlns:p="http://schemas.openxmlformats.org/presentationml/2006/main" xmlns:r="http://schemas.openxmlformats.org/officeDocument/2006/relationships">
+<p:sld xmlns:a="http://schemas.openxmlformats.org/drawingml/2006/main" xmlns:r="http://schemas.openxmlformats.org/officeDocument/2006/relationships" xmlns:p="http://schemas.openxmlformats.org/presentationml/2006/main">
   <p:cSld>
     <p:spTree>
       <p:nvGrpSpPr>
@@ -6554,7 +6483,14 @@
         <p:cNvGrpSpPr/>
         <p:nvPr/>
       </p:nvGrpSpPr>
-      <p:grpSpPr/>
+      <p:grpSpPr>
+        <a:xfrm>
+          <a:off x="0" y="0"/>
+          <a:ext cx="0" cy="0"/>
+          <a:chOff x="0" y="0"/>
+          <a:chExt cx="0" cy="0"/>
+        </a:xfrm>
+      </p:grpSpPr>
       <p:sp>
         <p:nvSpPr>
           <p:cNvPr id="2" name="Title 1"/>
@@ -6595,7 +6531,9 @@
               <a:t>From building faster to building correctly at scale.</a:t>
             </a:r>
           </a:p>
-          <a:p/>
+          <a:p>
+            <a:endParaRPr/>
+          </a:p>
           <a:p>
             <a:r>
               <a:t>Focus shifts from velocity to decision fidelity.</a:t>
@@ -6612,7 +6550,7 @@
 </file>
 
 <file path=ppt/slides/slide8.xml><?xml version="1.0" encoding="utf-8"?>
-<p:sld xmlns:a="http://schemas.openxmlformats.org/drawingml/2006/main" xmlns:p="http://schemas.openxmlformats.org/presentationml/2006/main" xmlns:r="http://schemas.openxmlformats.org/officeDocument/2006/relationships">
+<p:sld xmlns:a="http://schemas.openxmlformats.org/drawingml/2006/main" xmlns:r="http://schemas.openxmlformats.org/officeDocument/2006/relationships" xmlns:p="http://schemas.openxmlformats.org/presentationml/2006/main">
   <p:cSld>
     <p:spTree>
       <p:nvGrpSpPr>
@@ -6620,7 +6558,14 @@
         <p:cNvGrpSpPr/>
         <p:nvPr/>
       </p:nvGrpSpPr>
-      <p:grpSpPr/>
+      <p:grpSpPr>
+        <a:xfrm>
+          <a:off x="0" y="0"/>
+          <a:ext cx="0" cy="0"/>
+          <a:chOff x="0" y="0"/>
+          <a:chExt cx="0" cy="0"/>
+        </a:xfrm>
+      </p:grpSpPr>
       <p:sp>
         <p:nvSpPr>
           <p:cNvPr id="2" name="Title 1"/>
@@ -6658,26 +6603,39 @@
           <a:lstStyle/>
           <a:p>
             <a:r>
+              <a:rPr dirty="0"/>
               <a:t>1. Intent Declaration</a:t>
             </a:r>
           </a:p>
           <a:p>
             <a:r>
+              <a:rPr dirty="0"/>
               <a:t>2. Formal Specification</a:t>
             </a:r>
           </a:p>
           <a:p>
             <a:r>
-              <a:t>3. AI-Driven Derivation</a:t>
-            </a:r>
-          </a:p>
-          <a:p>
-            <a:r>
+              <a:rPr dirty="0"/>
+              <a:t>3. </a:t>
+            </a:r>
+            <a:r>
+              <a:t>AI-Driven </a:t>
+            </a:r>
+            <a:r>
+              <a:rPr lang="en-US"/>
+              <a:t>Implementation</a:t>
+            </a:r>
+            <a:endParaRPr dirty="0"/>
+          </a:p>
+          <a:p>
+            <a:r>
+              <a:rPr dirty="0"/>
               <a:t>4. Continuous Validation</a:t>
             </a:r>
           </a:p>
           <a:p>
             <a:r>
+              <a:rPr dirty="0"/>
               <a:t>5. Intent Evolution</a:t>
             </a:r>
           </a:p>
@@ -6692,7 +6650,7 @@
 </file>
 
 <file path=ppt/slides/slide9.xml><?xml version="1.0" encoding="utf-8"?>
-<p:sld xmlns:a="http://schemas.openxmlformats.org/drawingml/2006/main" xmlns:p="http://schemas.openxmlformats.org/presentationml/2006/main" xmlns:r="http://schemas.openxmlformats.org/officeDocument/2006/relationships">
+<p:sld xmlns:a="http://schemas.openxmlformats.org/drawingml/2006/main" xmlns:r="http://schemas.openxmlformats.org/officeDocument/2006/relationships" xmlns:p="http://schemas.openxmlformats.org/presentationml/2006/main">
   <p:cSld>
     <p:spTree>
       <p:nvGrpSpPr>
@@ -6700,7 +6658,14 @@
         <p:cNvGrpSpPr/>
         <p:nvPr/>
       </p:nvGrpSpPr>
-      <p:grpSpPr/>
+      <p:grpSpPr>
+        <a:xfrm>
+          <a:off x="0" y="0"/>
+          <a:ext cx="0" cy="0"/>
+          <a:chOff x="0" y="0"/>
+          <a:chExt cx="0" cy="0"/>
+        </a:xfrm>
+      </p:grpSpPr>
       <p:sp>
         <p:nvSpPr>
           <p:cNvPr id="2" name="Title 1"/>
@@ -7102,44 +7067,44 @@
         <a:sysClr val="window" lastClr="FFFFFF"/>
       </a:lt1>
       <a:dk2>
-        <a:srgbClr val="1F497D"/>
+        <a:srgbClr val="44546A"/>
       </a:dk2>
       <a:lt2>
-        <a:srgbClr val="EEECE1"/>
+        <a:srgbClr val="E7E6E6"/>
       </a:lt2>
       <a:accent1>
-        <a:srgbClr val="4F81BD"/>
+        <a:srgbClr val="4472C4"/>
       </a:accent1>
       <a:accent2>
-        <a:srgbClr val="C0504D"/>
+        <a:srgbClr val="ED7D31"/>
       </a:accent2>
       <a:accent3>
-        <a:srgbClr val="9BBB59"/>
+        <a:srgbClr val="A5A5A5"/>
       </a:accent3>
       <a:accent4>
-        <a:srgbClr val="8064A2"/>
+        <a:srgbClr val="FFC000"/>
       </a:accent4>
       <a:accent5>
-        <a:srgbClr val="4BACC6"/>
+        <a:srgbClr val="5B9BD5"/>
       </a:accent5>
       <a:accent6>
-        <a:srgbClr val="F79646"/>
+        <a:srgbClr val="70AD47"/>
       </a:accent6>
       <a:hlink>
-        <a:srgbClr val="0000FF"/>
+        <a:srgbClr val="0563C1"/>
       </a:hlink>
       <a:folHlink>
-        <a:srgbClr val="800080"/>
+        <a:srgbClr val="954F72"/>
       </a:folHlink>
     </a:clrScheme>
     <a:fontScheme name="Office">
       <a:majorFont>
-        <a:latin typeface="Calibri"/>
+        <a:latin typeface="Calibri Light" panose="020F0302020204030204"/>
         <a:ea typeface=""/>
         <a:cs typeface=""/>
-        <a:font script="Jpan" typeface="ＭＳ Ｐゴシック"/>
+        <a:font script="Jpan" typeface="游ゴシック Light"/>
         <a:font script="Hang" typeface="맑은 고딕"/>
-        <a:font script="Hans" typeface="宋体"/>
+        <a:font script="Hans" typeface="等线 Light"/>
         <a:font script="Hant" typeface="新細明體"/>
         <a:font script="Arab" typeface="Times New Roman"/>
         <a:font script="Hebr" typeface="Times New Roman"/>
@@ -7167,14 +7132,31 @@
         <a:font script="Viet" typeface="Times New Roman"/>
         <a:font script="Uigh" typeface="Microsoft Uighur"/>
         <a:font script="Geor" typeface="Sylfaen"/>
+        <a:font script="Armn" typeface="Arial"/>
+        <a:font script="Bugi" typeface="Leelawadee UI"/>
+        <a:font script="Bopo" typeface="Microsoft JhengHei"/>
+        <a:font script="Java" typeface="Javanese Text"/>
+        <a:font script="Lisu" typeface="Segoe UI"/>
+        <a:font script="Mymr" typeface="Myanmar Text"/>
+        <a:font script="Nkoo" typeface="Ebrima"/>
+        <a:font script="Olck" typeface="Nirmala UI"/>
+        <a:font script="Osma" typeface="Ebrima"/>
+        <a:font script="Phag" typeface="Phagspa"/>
+        <a:font script="Syrn" typeface="Estrangelo Edessa"/>
+        <a:font script="Syrj" typeface="Estrangelo Edessa"/>
+        <a:font script="Syre" typeface="Estrangelo Edessa"/>
+        <a:font script="Sora" typeface="Nirmala UI"/>
+        <a:font script="Tale" typeface="Microsoft Tai Le"/>
+        <a:font script="Talu" typeface="Microsoft New Tai Lue"/>
+        <a:font script="Tfng" typeface="Ebrima"/>
       </a:majorFont>
       <a:minorFont>
-        <a:latin typeface="Calibri"/>
+        <a:latin typeface="Calibri" panose="020F0502020204030204"/>
         <a:ea typeface=""/>
         <a:cs typeface=""/>
-        <a:font script="Jpan" typeface="ＭＳ Ｐゴシック"/>
+        <a:font script="Jpan" typeface="游ゴシック"/>
         <a:font script="Hang" typeface="맑은 고딕"/>
-        <a:font script="Hans" typeface="宋体"/>
+        <a:font script="Hans" typeface="等线"/>
         <a:font script="Hant" typeface="新細明體"/>
         <a:font script="Arab" typeface="Arial"/>
         <a:font script="Hebr" typeface="Arial"/>
@@ -7202,6 +7184,23 @@
         <a:font script="Viet" typeface="Arial"/>
         <a:font script="Uigh" typeface="Microsoft Uighur"/>
         <a:font script="Geor" typeface="Sylfaen"/>
+        <a:font script="Armn" typeface="Arial"/>
+        <a:font script="Bugi" typeface="Leelawadee UI"/>
+        <a:font script="Bopo" typeface="Microsoft JhengHei"/>
+        <a:font script="Java" typeface="Javanese Text"/>
+        <a:font script="Lisu" typeface="Segoe UI"/>
+        <a:font script="Mymr" typeface="Myanmar Text"/>
+        <a:font script="Nkoo" typeface="Ebrima"/>
+        <a:font script="Olck" typeface="Nirmala UI"/>
+        <a:font script="Osma" typeface="Ebrima"/>
+        <a:font script="Phag" typeface="Phagspa"/>
+        <a:font script="Syrn" typeface="Estrangelo Edessa"/>
+        <a:font script="Syrj" typeface="Estrangelo Edessa"/>
+        <a:font script="Syre" typeface="Estrangelo Edessa"/>
+        <a:font script="Sora" typeface="Nirmala UI"/>
+        <a:font script="Tale" typeface="Microsoft Tai Le"/>
+        <a:font script="Talu" typeface="Microsoft New Tai Lue"/>
+        <a:font script="Tfng" typeface="Ebrima"/>
       </a:minorFont>
     </a:fontScheme>
     <a:fmtScheme name="Office">
@@ -7213,200 +7212,141 @@
           <a:gsLst>
             <a:gs pos="0">
               <a:schemeClr val="phClr">
-                <a:tint val="50000"/>
-                <a:satMod val="300000"/>
+                <a:lumMod val="110000"/>
+                <a:satMod val="105000"/>
+                <a:tint val="67000"/>
               </a:schemeClr>
             </a:gs>
-            <a:gs pos="35000">
+            <a:gs pos="50000">
               <a:schemeClr val="phClr">
-                <a:tint val="37000"/>
-                <a:satMod val="300000"/>
+                <a:lumMod val="105000"/>
+                <a:satMod val="103000"/>
+                <a:tint val="73000"/>
               </a:schemeClr>
             </a:gs>
             <a:gs pos="100000">
               <a:schemeClr val="phClr">
-                <a:tint val="15000"/>
-                <a:satMod val="350000"/>
+                <a:lumMod val="105000"/>
+                <a:satMod val="109000"/>
+                <a:tint val="81000"/>
               </a:schemeClr>
             </a:gs>
           </a:gsLst>
-          <a:lin ang="16200000" scaled="1"/>
+          <a:lin ang="5400000" scaled="0"/>
         </a:gradFill>
         <a:gradFill rotWithShape="1">
           <a:gsLst>
             <a:gs pos="0">
               <a:schemeClr val="phClr">
-                <a:tint val="100000"/>
+                <a:satMod val="103000"/>
+                <a:lumMod val="102000"/>
+                <a:tint val="94000"/>
+              </a:schemeClr>
+            </a:gs>
+            <a:gs pos="50000">
+              <a:schemeClr val="phClr">
+                <a:satMod val="110000"/>
+                <a:lumMod val="100000"/>
                 <a:shade val="100000"/>
-                <a:satMod val="130000"/>
               </a:schemeClr>
             </a:gs>
             <a:gs pos="100000">
               <a:schemeClr val="phClr">
-                <a:tint val="50000"/>
-                <a:shade val="100000"/>
-                <a:satMod val="350000"/>
+                <a:lumMod val="99000"/>
+                <a:satMod val="120000"/>
+                <a:shade val="78000"/>
               </a:schemeClr>
             </a:gs>
           </a:gsLst>
-          <a:lin ang="16200000" scaled="0"/>
+          <a:lin ang="5400000" scaled="0"/>
         </a:gradFill>
       </a:fillStyleLst>
       <a:lnStyleLst>
-        <a:ln w="9525" cap="flat" cmpd="sng" algn="ctr">
-          <a:solidFill>
-            <a:schemeClr val="phClr">
-              <a:shade val="95000"/>
-              <a:satMod val="105000"/>
-            </a:schemeClr>
-          </a:solidFill>
-          <a:prstDash val="solid"/>
-        </a:ln>
-        <a:ln w="25400" cap="flat" cmpd="sng" algn="ctr">
+        <a:ln w="6350" cap="flat" cmpd="sng" algn="ctr">
           <a:solidFill>
             <a:schemeClr val="phClr"/>
           </a:solidFill>
           <a:prstDash val="solid"/>
+          <a:miter lim="800000"/>
         </a:ln>
-        <a:ln w="38100" cap="flat" cmpd="sng" algn="ctr">
+        <a:ln w="12700" cap="flat" cmpd="sng" algn="ctr">
           <a:solidFill>
             <a:schemeClr val="phClr"/>
           </a:solidFill>
           <a:prstDash val="solid"/>
+          <a:miter lim="800000"/>
+        </a:ln>
+        <a:ln w="19050" cap="flat" cmpd="sng" algn="ctr">
+          <a:solidFill>
+            <a:schemeClr val="phClr"/>
+          </a:solidFill>
+          <a:prstDash val="solid"/>
+          <a:miter lim="800000"/>
         </a:ln>
       </a:lnStyleLst>
       <a:effectStyleLst>
         <a:effectStyle>
+          <a:effectLst/>
+        </a:effectStyle>
+        <a:effectStyle>
+          <a:effectLst/>
+        </a:effectStyle>
+        <a:effectStyle>
           <a:effectLst>
-            <a:outerShdw blurRad="40000" dist="20000" dir="5400000" rotWithShape="0">
+            <a:outerShdw blurRad="57150" dist="19050" dir="5400000" algn="ctr" rotWithShape="0">
               <a:srgbClr val="000000">
-                <a:alpha val="38000"/>
+                <a:alpha val="63000"/>
               </a:srgbClr>
             </a:outerShdw>
           </a:effectLst>
-        </a:effectStyle>
-        <a:effectStyle>
-          <a:effectLst>
-            <a:outerShdw blurRad="40000" dist="23000" dir="5400000" rotWithShape="0">
-              <a:srgbClr val="000000">
-                <a:alpha val="35000"/>
-              </a:srgbClr>
-            </a:outerShdw>
-          </a:effectLst>
-        </a:effectStyle>
-        <a:effectStyle>
-          <a:effectLst>
-            <a:outerShdw blurRad="40000" dist="23000" dir="5400000" rotWithShape="0">
-              <a:srgbClr val="000000">
-                <a:alpha val="35000"/>
-              </a:srgbClr>
-            </a:outerShdw>
-          </a:effectLst>
-          <a:scene3d>
-            <a:camera prst="orthographicFront">
-              <a:rot lat="0" lon="0" rev="0"/>
-            </a:camera>
-            <a:lightRig rig="threePt" dir="t">
-              <a:rot lat="0" lon="0" rev="1200000"/>
-            </a:lightRig>
-          </a:scene3d>
-          <a:sp3d>
-            <a:bevelT w="63500" h="25400"/>
-          </a:sp3d>
         </a:effectStyle>
       </a:effectStyleLst>
       <a:bgFillStyleLst>
         <a:solidFill>
           <a:schemeClr val="phClr"/>
         </a:solidFill>
+        <a:solidFill>
+          <a:schemeClr val="phClr">
+            <a:tint val="95000"/>
+            <a:satMod val="170000"/>
+          </a:schemeClr>
+        </a:solidFill>
         <a:gradFill rotWithShape="1">
           <a:gsLst>
             <a:gs pos="0">
               <a:schemeClr val="phClr">
-                <a:tint val="40000"/>
-                <a:satMod val="350000"/>
+                <a:tint val="93000"/>
+                <a:satMod val="150000"/>
+                <a:shade val="98000"/>
+                <a:lumMod val="102000"/>
               </a:schemeClr>
             </a:gs>
-            <a:gs pos="40000">
+            <a:gs pos="50000">
               <a:schemeClr val="phClr">
-                <a:tint val="45000"/>
-                <a:shade val="99000"/>
-                <a:satMod val="350000"/>
+                <a:tint val="98000"/>
+                <a:satMod val="130000"/>
+                <a:shade val="90000"/>
+                <a:lumMod val="103000"/>
               </a:schemeClr>
             </a:gs>
             <a:gs pos="100000">
               <a:schemeClr val="phClr">
-                <a:shade val="20000"/>
-                <a:satMod val="255000"/>
+                <a:shade val="63000"/>
+                <a:satMod val="120000"/>
               </a:schemeClr>
             </a:gs>
           </a:gsLst>
-          <a:path path="circle">
-            <a:fillToRect l="50000" t="-80000" r="50000" b="180000"/>
-          </a:path>
-        </a:gradFill>
-        <a:gradFill rotWithShape="1">
-          <a:gsLst>
-            <a:gs pos="0">
-              <a:schemeClr val="phClr">
-                <a:tint val="80000"/>
-                <a:satMod val="300000"/>
-              </a:schemeClr>
-            </a:gs>
-            <a:gs pos="100000">
-              <a:schemeClr val="phClr">
-                <a:shade val="30000"/>
-                <a:satMod val="200000"/>
-              </a:schemeClr>
-            </a:gs>
-          </a:gsLst>
-          <a:path path="circle">
-            <a:fillToRect l="50000" t="50000" r="50000" b="50000"/>
-          </a:path>
+          <a:lin ang="5400000" scaled="0"/>
         </a:gradFill>
       </a:bgFillStyleLst>
     </a:fmtScheme>
   </a:themeElements>
-  <a:objectDefaults>
-    <a:spDef>
-      <a:spPr/>
-      <a:bodyPr/>
-      <a:lstStyle/>
-      <a:style>
-        <a:lnRef idx="1">
-          <a:schemeClr val="accent1"/>
-        </a:lnRef>
-        <a:fillRef idx="3">
-          <a:schemeClr val="accent1"/>
-        </a:fillRef>
-        <a:effectRef idx="2">
-          <a:schemeClr val="accent1"/>
-        </a:effectRef>
-        <a:fontRef idx="minor">
-          <a:schemeClr val="lt1"/>
-        </a:fontRef>
-      </a:style>
-    </a:spDef>
-    <a:lnDef>
-      <a:spPr/>
-      <a:bodyPr/>
-      <a:lstStyle/>
-      <a:style>
-        <a:lnRef idx="2">
-          <a:schemeClr val="accent1"/>
-        </a:lnRef>
-        <a:fillRef idx="0">
-          <a:schemeClr val="accent1"/>
-        </a:fillRef>
-        <a:effectRef idx="1">
-          <a:schemeClr val="accent1"/>
-        </a:effectRef>
-        <a:fontRef idx="minor">
-          <a:schemeClr val="tx1"/>
-        </a:fontRef>
-      </a:style>
-    </a:lnDef>
-  </a:objectDefaults>
+  <a:objectDefaults/>
   <a:extraClrSchemeLst/>
+  <a:extLst>
+    <a:ext uri="{05A4C25C-085E-4340-85A3-A5531E510DB2}">
+      <thm15:themeFamily xmlns:thm15="http://schemas.microsoft.com/office/thememl/2012/main" name="Office Theme" id="{62F939B6-93AF-4DB8-9C6B-D6C7DFDC589F}" vid="{4A3C46E8-61CC-4603-A589-7422A47A8E4A}"/>
+    </a:ext>
+  </a:extLst>
 </a:theme>
 </file>
</xml_diff>